<commit_message>
Updating results and poster
</commit_message>
<xml_diff>
--- a/GridWorld/Results/PosterPresentation.pptx
+++ b/GridWorld/Results/PosterPresentation.pptx
@@ -109,273 +109,7 @@
 
 <file path=ppt/charts/chart1.xml><?xml version="1.0" encoding="utf-8"?>
 <c:chartSpace xmlns:c="http://schemas.openxmlformats.org/drawingml/2006/chart" xmlns:a="http://schemas.openxmlformats.org/drawingml/2006/main" xmlns:r="http://schemas.openxmlformats.org/officeDocument/2006/relationships">
-  <c:date1904 val="0"/>
   <c:lang val="en-US"/>
-  <c:roundedCorners val="0"/>
-  <mc:AlternateContent xmlns:mc="http://schemas.openxmlformats.org/markup-compatibility/2006">
-    <mc:Choice xmlns:c14="http://schemas.microsoft.com/office/drawing/2007/8/2/chart" Requires="c14">
-      <c14:style val="102"/>
-    </mc:Choice>
-    <mc:Fallback>
-      <c:style val="2"/>
-    </mc:Fallback>
-  </mc:AlternateContent>
-  <c:chart>
-    <c:title>
-      <c:tx>
-        <c:rich>
-          <a:bodyPr/>
-          <a:lstStyle/>
-          <a:p>
-            <a:pPr>
-              <a:defRPr sz="2800"/>
-            </a:pPr>
-            <a:r>
-              <a:rPr lang="en-US" sz="2800"/>
-              <a:t>Time Histograms</a:t>
-            </a:r>
-          </a:p>
-        </c:rich>
-      </c:tx>
-      <c:layout/>
-      <c:overlay val="0"/>
-    </c:title>
-    <c:autoTitleDeleted val="0"/>
-    <c:plotArea>
-      <c:layout/>
-      <c:barChart>
-        <c:barDir val="bar"/>
-        <c:grouping val="clustered"/>
-        <c:varyColors val="0"/>
-        <c:ser>
-          <c:idx val="2"/>
-          <c:order val="0"/>
-          <c:tx>
-            <c:v>RoomSplit</c:v>
-          </c:tx>
-          <c:invertIfNegative val="0"/>
-          <c:cat>
-            <c:numRef>
-              <c:f>Histograms!$G$3:$G$9</c:f>
-              <c:numCache>
-                <c:formatCode>General</c:formatCode>
-                <c:ptCount val="7"/>
-                <c:pt idx="0">
-                  <c:v>50</c:v>
-                </c:pt>
-                <c:pt idx="1">
-                  <c:v>100</c:v>
-                </c:pt>
-                <c:pt idx="2">
-                  <c:v>150</c:v>
-                </c:pt>
-                <c:pt idx="3">
-                  <c:v>200</c:v>
-                </c:pt>
-                <c:pt idx="4">
-                  <c:v>250</c:v>
-                </c:pt>
-                <c:pt idx="5">
-                  <c:v>300</c:v>
-                </c:pt>
-                <c:pt idx="6">
-                  <c:v>350</c:v>
-                </c:pt>
-              </c:numCache>
-            </c:numRef>
-          </c:cat>
-          <c:val>
-            <c:numRef>
-              <c:f>Histograms!$H$3:$H$9</c:f>
-              <c:numCache>
-                <c:formatCode>General</c:formatCode>
-                <c:ptCount val="7"/>
-                <c:pt idx="0">
-                  <c:v>23</c:v>
-                </c:pt>
-                <c:pt idx="1">
-                  <c:v>885</c:v>
-                </c:pt>
-                <c:pt idx="2">
-                  <c:v>397</c:v>
-                </c:pt>
-                <c:pt idx="3">
-                  <c:v>100</c:v>
-                </c:pt>
-                <c:pt idx="4">
-                  <c:v>27</c:v>
-                </c:pt>
-                <c:pt idx="5">
-                  <c:v>7</c:v>
-                </c:pt>
-                <c:pt idx="6">
-                  <c:v>1</c:v>
-                </c:pt>
-              </c:numCache>
-            </c:numRef>
-          </c:val>
-        </c:ser>
-        <c:ser>
-          <c:idx val="1"/>
-          <c:order val="1"/>
-          <c:tx>
-            <c:v>Even Split</c:v>
-          </c:tx>
-          <c:invertIfNegative val="0"/>
-          <c:val>
-            <c:numRef>
-              <c:f>Histograms!$K$3:$K$9</c:f>
-              <c:numCache>
-                <c:formatCode>General</c:formatCode>
-                <c:ptCount val="7"/>
-                <c:pt idx="0">
-                  <c:v>13</c:v>
-                </c:pt>
-                <c:pt idx="1">
-                  <c:v>745</c:v>
-                </c:pt>
-                <c:pt idx="2">
-                  <c:v>507</c:v>
-                </c:pt>
-                <c:pt idx="3">
-                  <c:v>106</c:v>
-                </c:pt>
-                <c:pt idx="4">
-                  <c:v>14</c:v>
-                </c:pt>
-                <c:pt idx="5">
-                  <c:v>2</c:v>
-                </c:pt>
-                <c:pt idx="6">
-                  <c:v>2</c:v>
-                </c:pt>
-              </c:numCache>
-            </c:numRef>
-          </c:val>
-        </c:ser>
-        <c:dLbls>
-          <c:showLegendKey val="0"/>
-          <c:showVal val="0"/>
-          <c:showCatName val="0"/>
-          <c:showSerName val="0"/>
-          <c:showPercent val="0"/>
-          <c:showBubbleSize val="0"/>
-        </c:dLbls>
-        <c:gapWidth val="150"/>
-        <c:axId val="41380480"/>
-        <c:axId val="76932992"/>
-      </c:barChart>
-      <c:catAx>
-        <c:axId val="41380480"/>
-        <c:scaling>
-          <c:orientation val="minMax"/>
-        </c:scaling>
-        <c:delete val="0"/>
-        <c:axPos val="l"/>
-        <c:title>
-          <c:tx>
-            <c:rich>
-              <a:bodyPr rot="-5400000" vert="horz"/>
-              <a:lstStyle/>
-              <a:p>
-                <a:pPr>
-                  <a:defRPr sz="2000"/>
-                </a:pPr>
-                <a:r>
-                  <a:rPr lang="en-US" sz="2000"/>
-                  <a:t>Time Slots</a:t>
-                </a:r>
-              </a:p>
-            </c:rich>
-          </c:tx>
-          <c:layout/>
-          <c:overlay val="0"/>
-        </c:title>
-        <c:numFmt formatCode="General" sourceLinked="1"/>
-        <c:majorTickMark val="out"/>
-        <c:minorTickMark val="none"/>
-        <c:tickLblPos val="nextTo"/>
-        <c:crossAx val="76932992"/>
-        <c:crosses val="autoZero"/>
-        <c:auto val="1"/>
-        <c:lblAlgn val="ctr"/>
-        <c:lblOffset val="100"/>
-        <c:noMultiLvlLbl val="0"/>
-      </c:catAx>
-      <c:valAx>
-        <c:axId val="76932992"/>
-        <c:scaling>
-          <c:orientation val="minMax"/>
-        </c:scaling>
-        <c:delete val="0"/>
-        <c:axPos val="b"/>
-        <c:majorGridlines/>
-        <c:title>
-          <c:tx>
-            <c:rich>
-              <a:bodyPr/>
-              <a:lstStyle/>
-              <a:p>
-                <a:pPr>
-                  <a:defRPr sz="2000"/>
-                </a:pPr>
-                <a:r>
-                  <a:rPr lang="en-US" sz="2000"/>
-                  <a:t>Customers</a:t>
-                </a:r>
-              </a:p>
-            </c:rich>
-          </c:tx>
-          <c:layout/>
-          <c:overlay val="0"/>
-        </c:title>
-        <c:numFmt formatCode="General" sourceLinked="1"/>
-        <c:majorTickMark val="out"/>
-        <c:minorTickMark val="none"/>
-        <c:tickLblPos val="nextTo"/>
-        <c:crossAx val="41380480"/>
-        <c:crosses val="autoZero"/>
-        <c:crossBetween val="between"/>
-      </c:valAx>
-    </c:plotArea>
-    <c:legend>
-      <c:legendPos val="r"/>
-      <c:layout/>
-      <c:overlay val="0"/>
-      <c:txPr>
-        <a:bodyPr/>
-        <a:lstStyle/>
-        <a:p>
-          <a:pPr>
-            <a:defRPr sz="2000"/>
-          </a:pPr>
-          <a:endParaRPr lang="en-US"/>
-        </a:p>
-      </c:txPr>
-    </c:legend>
-    <c:plotVisOnly val="1"/>
-    <c:dispBlanksAs val="gap"/>
-    <c:showDLblsOverMax val="0"/>
-  </c:chart>
-  <c:externalData r:id="rId1">
-    <c:autoUpdate val="0"/>
-  </c:externalData>
-</c:chartSpace>
-</file>
-
-<file path=ppt/charts/chart2.xml><?xml version="1.0" encoding="utf-8"?>
-<c:chartSpace xmlns:c="http://schemas.openxmlformats.org/drawingml/2006/chart" xmlns:a="http://schemas.openxmlformats.org/drawingml/2006/main" xmlns:r="http://schemas.openxmlformats.org/officeDocument/2006/relationships">
-  <c:date1904 val="0"/>
-  <c:lang val="en-US"/>
-  <c:roundedCorners val="0"/>
-  <mc:AlternateContent xmlns:mc="http://schemas.openxmlformats.org/markup-compatibility/2006">
-    <mc:Choice xmlns:c14="http://schemas.microsoft.com/office/drawing/2007/8/2/chart" Requires="c14">
-      <c14:style val="102"/>
-    </mc:Choice>
-    <mc:Fallback>
-      <c:style val="2"/>
-    </mc:Fallback>
-  </mc:AlternateContent>
   <c:chart>
     <c:title>
       <c:tx>
@@ -420,14 +154,11 @@
         </c:rich>
       </c:tx>
       <c:layout/>
-      <c:overlay val="0"/>
     </c:title>
-    <c:autoTitleDeleted val="0"/>
     <c:plotArea>
       <c:layout/>
       <c:scatterChart>
         <c:scatterStyle val="lineMarker"/>
-        <c:varyColors val="0"/>
         <c:ser>
           <c:idx val="0"/>
           <c:order val="0"/>
@@ -8803,27 +8534,18 @@
               </c:numCache>
             </c:numRef>
           </c:yVal>
-          <c:smooth val="0"/>
         </c:ser>
-        <c:dLbls>
-          <c:showLegendKey val="0"/>
-          <c:showVal val="0"/>
-          <c:showCatName val="0"/>
-          <c:showSerName val="0"/>
-          <c:showPercent val="0"/>
-          <c:showBubbleSize val="0"/>
-        </c:dLbls>
-        <c:axId val="33961472"/>
-        <c:axId val="34019584"/>
+        <c:dLbls/>
+        <c:axId val="52219264"/>
+        <c:axId val="63116800"/>
       </c:scatterChart>
       <c:valAx>
-        <c:axId val="33961472"/>
+        <c:axId val="52219264"/>
         <c:scaling>
           <c:orientation val="minMax"/>
           <c:max val="31000"/>
           <c:min val="0"/>
         </c:scaling>
-        <c:delete val="0"/>
         <c:axPos val="b"/>
         <c:title>
           <c:tx>
@@ -8847,22 +8569,18 @@
             </c:rich>
           </c:tx>
           <c:layout/>
-          <c:overlay val="0"/>
         </c:title>
         <c:numFmt formatCode="General" sourceLinked="1"/>
-        <c:majorTickMark val="out"/>
-        <c:minorTickMark val="none"/>
         <c:tickLblPos val="nextTo"/>
-        <c:crossAx val="34019584"/>
+        <c:crossAx val="63116800"/>
         <c:crosses val="autoZero"/>
         <c:crossBetween val="midCat"/>
       </c:valAx>
       <c:valAx>
-        <c:axId val="34019584"/>
+        <c:axId val="63116800"/>
         <c:scaling>
           <c:orientation val="minMax"/>
         </c:scaling>
-        <c:delete val="0"/>
         <c:axPos val="l"/>
         <c:majorGridlines/>
         <c:title>
@@ -8908,13 +8626,10 @@
             </c:rich>
           </c:tx>
           <c:layout/>
-          <c:overlay val="0"/>
         </c:title>
         <c:numFmt formatCode="General" sourceLinked="1"/>
-        <c:majorTickMark val="out"/>
-        <c:minorTickMark val="none"/>
         <c:tickLblPos val="nextTo"/>
-        <c:crossAx val="33961472"/>
+        <c:crossAx val="52219264"/>
         <c:crosses val="autoZero"/>
         <c:crossBetween val="midCat"/>
       </c:valAx>
@@ -8922,7 +8637,6 @@
     <c:legend>
       <c:legendPos val="r"/>
       <c:layout/>
-      <c:overlay val="0"/>
       <c:txPr>
         <a:bodyPr/>
         <a:lstStyle/>
@@ -8936,27 +8650,14 @@
     </c:legend>
     <c:plotVisOnly val="1"/>
     <c:dispBlanksAs val="gap"/>
-    <c:showDLblsOverMax val="0"/>
   </c:chart>
-  <c:externalData r:id="rId1">
-    <c:autoUpdate val="0"/>
-  </c:externalData>
+  <c:externalData r:id="rId1"/>
 </c:chartSpace>
 </file>
 
-<file path=ppt/charts/chart3.xml><?xml version="1.0" encoding="utf-8"?>
+<file path=ppt/charts/chart2.xml><?xml version="1.0" encoding="utf-8"?>
 <c:chartSpace xmlns:c="http://schemas.openxmlformats.org/drawingml/2006/chart" xmlns:a="http://schemas.openxmlformats.org/drawingml/2006/main" xmlns:r="http://schemas.openxmlformats.org/officeDocument/2006/relationships">
-  <c:date1904 val="0"/>
   <c:lang val="en-US"/>
-  <c:roundedCorners val="0"/>
-  <mc:AlternateContent xmlns:mc="http://schemas.openxmlformats.org/markup-compatibility/2006">
-    <mc:Choice xmlns:c14="http://schemas.microsoft.com/office/drawing/2007/8/2/chart" Requires="c14">
-      <c14:style val="102"/>
-    </mc:Choice>
-    <mc:Fallback>
-      <c:style val="2"/>
-    </mc:Fallback>
-  </mc:AlternateContent>
   <c:chart>
     <c:title>
       <c:tx>
@@ -8980,14 +8681,11 @@
         </c:rich>
       </c:tx>
       <c:layout/>
-      <c:overlay val="0"/>
     </c:title>
-    <c:autoTitleDeleted val="0"/>
     <c:plotArea>
       <c:layout/>
       <c:scatterChart>
         <c:scatterStyle val="lineMarker"/>
-        <c:varyColors val="0"/>
         <c:ser>
           <c:idx val="0"/>
           <c:order val="0"/>
@@ -17369,27 +17067,18 @@
               </c:numCache>
             </c:numRef>
           </c:yVal>
-          <c:smooth val="0"/>
         </c:ser>
-        <c:dLbls>
-          <c:showLegendKey val="0"/>
-          <c:showVal val="0"/>
-          <c:showCatName val="0"/>
-          <c:showSerName val="0"/>
-          <c:showPercent val="0"/>
-          <c:showBubbleSize val="0"/>
-        </c:dLbls>
-        <c:axId val="34192768"/>
-        <c:axId val="34206080"/>
+        <c:dLbls/>
+        <c:axId val="63137664"/>
+        <c:axId val="63143936"/>
       </c:scatterChart>
       <c:valAx>
-        <c:axId val="34192768"/>
+        <c:axId val="63137664"/>
         <c:scaling>
           <c:orientation val="minMax"/>
           <c:max val="31000"/>
           <c:min val="0"/>
         </c:scaling>
-        <c:delete val="0"/>
         <c:axPos val="b"/>
         <c:title>
           <c:tx>
@@ -17412,22 +17101,18 @@
             </c:rich>
           </c:tx>
           <c:layout/>
-          <c:overlay val="0"/>
         </c:title>
         <c:numFmt formatCode="General" sourceLinked="1"/>
-        <c:majorTickMark val="out"/>
-        <c:minorTickMark val="none"/>
         <c:tickLblPos val="nextTo"/>
-        <c:crossAx val="34206080"/>
+        <c:crossAx val="63143936"/>
         <c:crosses val="autoZero"/>
         <c:crossBetween val="midCat"/>
       </c:valAx>
       <c:valAx>
-        <c:axId val="34206080"/>
+        <c:axId val="63143936"/>
         <c:scaling>
           <c:orientation val="minMax"/>
         </c:scaling>
-        <c:delete val="0"/>
         <c:axPos val="l"/>
         <c:majorGridlines/>
         <c:title>
@@ -17452,13 +17137,10 @@
             </c:rich>
           </c:tx>
           <c:layout/>
-          <c:overlay val="0"/>
         </c:title>
         <c:numFmt formatCode="General" sourceLinked="1"/>
-        <c:majorTickMark val="out"/>
-        <c:minorTickMark val="none"/>
         <c:tickLblPos val="nextTo"/>
-        <c:crossAx val="34192768"/>
+        <c:crossAx val="63137664"/>
         <c:crosses val="autoZero"/>
         <c:crossBetween val="midCat"/>
       </c:valAx>
@@ -17466,7 +17148,6 @@
     <c:legend>
       <c:legendPos val="r"/>
       <c:layout/>
-      <c:overlay val="0"/>
       <c:txPr>
         <a:bodyPr/>
         <a:lstStyle/>
@@ -17480,11 +17161,339 @@
     </c:legend>
     <c:plotVisOnly val="1"/>
     <c:dispBlanksAs val="gap"/>
-    <c:showDLblsOverMax val="0"/>
   </c:chart>
-  <c:externalData r:id="rId1">
-    <c:autoUpdate val="0"/>
-  </c:externalData>
+  <c:externalData r:id="rId1"/>
+</c:chartSpace>
+</file>
+
+<file path=ppt/charts/chart3.xml><?xml version="1.0" encoding="utf-8"?>
+<c:chartSpace xmlns:c="http://schemas.openxmlformats.org/drawingml/2006/chart" xmlns:a="http://schemas.openxmlformats.org/drawingml/2006/main" xmlns:r="http://schemas.openxmlformats.org/officeDocument/2006/relationships">
+  <c:lang val="en-US"/>
+  <c:chart>
+    <c:title>
+      <c:tx>
+        <c:rich>
+          <a:bodyPr/>
+          <a:lstStyle/>
+          <a:p>
+            <a:pPr>
+              <a:defRPr sz="2800"/>
+            </a:pPr>
+            <a:r>
+              <a:rPr lang="en-US" sz="2800"/>
+              <a:t>Time Histograms</a:t>
+            </a:r>
+          </a:p>
+        </c:rich>
+      </c:tx>
+      <c:layout/>
+    </c:title>
+    <c:plotArea>
+      <c:layout/>
+      <c:barChart>
+        <c:barDir val="bar"/>
+        <c:grouping val="clustered"/>
+        <c:ser>
+          <c:idx val="2"/>
+          <c:order val="0"/>
+          <c:tx>
+            <c:v>Room Split</c:v>
+          </c:tx>
+          <c:cat>
+            <c:strRef>
+              <c:f>Histograms!$A$14:$A$21</c:f>
+              <c:strCache>
+                <c:ptCount val="8"/>
+                <c:pt idx="0">
+                  <c:v>50</c:v>
+                </c:pt>
+                <c:pt idx="1">
+                  <c:v>100</c:v>
+                </c:pt>
+                <c:pt idx="2">
+                  <c:v>150</c:v>
+                </c:pt>
+                <c:pt idx="3">
+                  <c:v>200</c:v>
+                </c:pt>
+                <c:pt idx="4">
+                  <c:v>250</c:v>
+                </c:pt>
+                <c:pt idx="5">
+                  <c:v>300</c:v>
+                </c:pt>
+                <c:pt idx="6">
+                  <c:v>350</c:v>
+                </c:pt>
+                <c:pt idx="7">
+                  <c:v>Above</c:v>
+                </c:pt>
+              </c:strCache>
+            </c:strRef>
+          </c:cat>
+          <c:val>
+            <c:numRef>
+              <c:f>Histograms!$H$3:$H$10</c:f>
+              <c:numCache>
+                <c:formatCode>General</c:formatCode>
+                <c:ptCount val="8"/>
+                <c:pt idx="0">
+                  <c:v>23</c:v>
+                </c:pt>
+                <c:pt idx="1">
+                  <c:v>885</c:v>
+                </c:pt>
+                <c:pt idx="2">
+                  <c:v>397</c:v>
+                </c:pt>
+                <c:pt idx="3">
+                  <c:v>100</c:v>
+                </c:pt>
+                <c:pt idx="4">
+                  <c:v>27</c:v>
+                </c:pt>
+                <c:pt idx="5">
+                  <c:v>7</c:v>
+                </c:pt>
+                <c:pt idx="6">
+                  <c:v>1</c:v>
+                </c:pt>
+                <c:pt idx="7">
+                  <c:v>0</c:v>
+                </c:pt>
+              </c:numCache>
+            </c:numRef>
+          </c:val>
+        </c:ser>
+        <c:ser>
+          <c:idx val="1"/>
+          <c:order val="1"/>
+          <c:tx>
+            <c:v>Jobs Evenly Split</c:v>
+          </c:tx>
+          <c:cat>
+            <c:strRef>
+              <c:f>Histograms!$A$14:$A$21</c:f>
+              <c:strCache>
+                <c:ptCount val="8"/>
+                <c:pt idx="0">
+                  <c:v>50</c:v>
+                </c:pt>
+                <c:pt idx="1">
+                  <c:v>100</c:v>
+                </c:pt>
+                <c:pt idx="2">
+                  <c:v>150</c:v>
+                </c:pt>
+                <c:pt idx="3">
+                  <c:v>200</c:v>
+                </c:pt>
+                <c:pt idx="4">
+                  <c:v>250</c:v>
+                </c:pt>
+                <c:pt idx="5">
+                  <c:v>300</c:v>
+                </c:pt>
+                <c:pt idx="6">
+                  <c:v>350</c:v>
+                </c:pt>
+                <c:pt idx="7">
+                  <c:v>Above</c:v>
+                </c:pt>
+              </c:strCache>
+            </c:strRef>
+          </c:cat>
+          <c:val>
+            <c:numRef>
+              <c:f>Histograms!$K$3:$K$10</c:f>
+              <c:numCache>
+                <c:formatCode>General</c:formatCode>
+                <c:ptCount val="8"/>
+                <c:pt idx="0">
+                  <c:v>13</c:v>
+                </c:pt>
+                <c:pt idx="1">
+                  <c:v>745</c:v>
+                </c:pt>
+                <c:pt idx="2">
+                  <c:v>507</c:v>
+                </c:pt>
+                <c:pt idx="3">
+                  <c:v>106</c:v>
+                </c:pt>
+                <c:pt idx="4">
+                  <c:v>14</c:v>
+                </c:pt>
+                <c:pt idx="5">
+                  <c:v>2</c:v>
+                </c:pt>
+                <c:pt idx="6">
+                  <c:v>2</c:v>
+                </c:pt>
+                <c:pt idx="7">
+                  <c:v>0</c:v>
+                </c:pt>
+              </c:numCache>
+            </c:numRef>
+          </c:val>
+        </c:ser>
+        <c:ser>
+          <c:idx val="0"/>
+          <c:order val="2"/>
+          <c:tx>
+            <c:v>Free For All</c:v>
+          </c:tx>
+          <c:cat>
+            <c:strRef>
+              <c:f>Histograms!$A$14:$A$21</c:f>
+              <c:strCache>
+                <c:ptCount val="8"/>
+                <c:pt idx="0">
+                  <c:v>50</c:v>
+                </c:pt>
+                <c:pt idx="1">
+                  <c:v>100</c:v>
+                </c:pt>
+                <c:pt idx="2">
+                  <c:v>150</c:v>
+                </c:pt>
+                <c:pt idx="3">
+                  <c:v>200</c:v>
+                </c:pt>
+                <c:pt idx="4">
+                  <c:v>250</c:v>
+                </c:pt>
+                <c:pt idx="5">
+                  <c:v>300</c:v>
+                </c:pt>
+                <c:pt idx="6">
+                  <c:v>350</c:v>
+                </c:pt>
+                <c:pt idx="7">
+                  <c:v>Above</c:v>
+                </c:pt>
+              </c:strCache>
+            </c:strRef>
+          </c:cat>
+          <c:val>
+            <c:numRef>
+              <c:f>Histograms!$N$3:$N$10</c:f>
+              <c:numCache>
+                <c:formatCode>General</c:formatCode>
+                <c:ptCount val="8"/>
+                <c:pt idx="0">
+                  <c:v>53</c:v>
+                </c:pt>
+                <c:pt idx="1">
+                  <c:v>507</c:v>
+                </c:pt>
+                <c:pt idx="2">
+                  <c:v>430</c:v>
+                </c:pt>
+                <c:pt idx="3">
+                  <c:v>218</c:v>
+                </c:pt>
+                <c:pt idx="4">
+                  <c:v>100</c:v>
+                </c:pt>
+                <c:pt idx="5">
+                  <c:v>48</c:v>
+                </c:pt>
+                <c:pt idx="6">
+                  <c:v>20</c:v>
+                </c:pt>
+                <c:pt idx="7">
+                  <c:v>14</c:v>
+                </c:pt>
+              </c:numCache>
+            </c:numRef>
+          </c:val>
+        </c:ser>
+        <c:axId val="120686848"/>
+        <c:axId val="123729408"/>
+      </c:barChart>
+      <c:catAx>
+        <c:axId val="120686848"/>
+        <c:scaling>
+          <c:orientation val="minMax"/>
+        </c:scaling>
+        <c:axPos val="l"/>
+        <c:title>
+          <c:tx>
+            <c:rich>
+              <a:bodyPr rot="-5400000" vert="horz"/>
+              <a:lstStyle/>
+              <a:p>
+                <a:pPr>
+                  <a:defRPr/>
+                </a:pPr>
+                <a:r>
+                  <a:rPr lang="en-US" sz="2000" dirty="0"/>
+                  <a:t>Time Slots</a:t>
+                </a:r>
+              </a:p>
+            </c:rich>
+          </c:tx>
+          <c:layout/>
+        </c:title>
+        <c:numFmt formatCode="General" sourceLinked="1"/>
+        <c:tickLblPos val="nextTo"/>
+        <c:crossAx val="123729408"/>
+        <c:crosses val="autoZero"/>
+        <c:auto val="1"/>
+        <c:lblAlgn val="ctr"/>
+        <c:lblOffset val="100"/>
+      </c:catAx>
+      <c:valAx>
+        <c:axId val="123729408"/>
+        <c:scaling>
+          <c:orientation val="minMax"/>
+        </c:scaling>
+        <c:axPos val="b"/>
+        <c:majorGridlines/>
+        <c:title>
+          <c:tx>
+            <c:rich>
+              <a:bodyPr/>
+              <a:lstStyle/>
+              <a:p>
+                <a:pPr>
+                  <a:defRPr/>
+                </a:pPr>
+                <a:r>
+                  <a:rPr lang="en-US" sz="2000" dirty="0"/>
+                  <a:t>Customers</a:t>
+                </a:r>
+              </a:p>
+            </c:rich>
+          </c:tx>
+          <c:layout/>
+        </c:title>
+        <c:numFmt formatCode="General" sourceLinked="1"/>
+        <c:tickLblPos val="nextTo"/>
+        <c:crossAx val="120686848"/>
+        <c:crosses val="autoZero"/>
+        <c:crossBetween val="between"/>
+      </c:valAx>
+    </c:plotArea>
+    <c:legend>
+      <c:legendPos val="r"/>
+      <c:layout/>
+      <c:txPr>
+        <a:bodyPr/>
+        <a:lstStyle/>
+        <a:p>
+          <a:pPr>
+            <a:defRPr sz="2000"/>
+          </a:pPr>
+          <a:endParaRPr lang="en-US"/>
+        </a:p>
+      </c:txPr>
+    </c:legend>
+    <c:plotVisOnly val="1"/>
+    <c:dispBlanksAs val="gap"/>
+  </c:chart>
+  <c:externalData r:id="rId1"/>
 </c:chartSpace>
 </file>
 
@@ -18443,15 +18452,7 @@
         <a:p>
           <a:r>
             <a:rPr lang="en-US" dirty="0" smtClean="0"/>
-            <a:t>Robot Server </a:t>
-          </a:r>
-          <a:r>
-            <a:rPr lang="en-US" dirty="0" smtClean="0"/>
-            <a:t>receives food </a:t>
-          </a:r>
-          <a:r>
-            <a:rPr lang="en-US" dirty="0" smtClean="0"/>
-            <a:t>from robot arm</a:t>
+            <a:t>Robot Server receives food from robot arm</a:t>
           </a:r>
           <a:endParaRPr lang="en-US" dirty="0"/>
         </a:p>
@@ -18811,31 +18812,31 @@
     </dgm:pt>
   </dgm:ptLst>
   <dgm:cxnLst>
+    <dgm:cxn modelId="{B9876142-B23B-4347-A968-842F8114BD52}" srcId="{9C6D5CE4-86D8-4664-9A20-DC92DA18EE08}" destId="{4DE6D936-E174-4051-B1D8-1BDDF24DB5F8}" srcOrd="6" destOrd="0" parTransId="{C9F1BA76-0055-4B26-A0A4-7EA152022C36}" sibTransId="{E70761AC-F5FD-4E3F-B9B3-570C3DB3E6F1}"/>
+    <dgm:cxn modelId="{57491815-AFA0-4A87-9628-EFCBCEEDFEDF}" srcId="{9C6D5CE4-86D8-4664-9A20-DC92DA18EE08}" destId="{DFDACCFF-42CC-4B9B-8D93-6006CBD8456B}" srcOrd="2" destOrd="0" parTransId="{4E7C24F4-A9F5-4B43-92B7-FB0F7B0F8248}" sibTransId="{FD442C12-20BF-4F71-9045-341C950E77ED}"/>
+    <dgm:cxn modelId="{264287FB-723D-42A6-AEBD-F6231388F8B8}" srcId="{9C6D5CE4-86D8-4664-9A20-DC92DA18EE08}" destId="{4AA12DA5-20BB-44FB-966A-ED64A8FDC723}" srcOrd="1" destOrd="0" parTransId="{1BA64373-1244-4343-AF96-187B5FB4BCF4}" sibTransId="{7C389107-6123-41DD-ABD8-3853D285C045}"/>
+    <dgm:cxn modelId="{CB6D9968-05A6-4AC1-83CB-94D4DDF2D426}" type="presOf" srcId="{4AA12DA5-20BB-44FB-966A-ED64A8FDC723}" destId="{3E08DC01-4D3A-4D19-B9F8-0C1143F8B68A}" srcOrd="0" destOrd="0" presId="urn:microsoft.com/office/officeart/2005/8/layout/cycle5"/>
+    <dgm:cxn modelId="{1F38BCFE-0D44-4AF3-A144-FB4842AF5D9A}" type="presOf" srcId="{2EBE1526-034E-4846-BA5B-7E67FD940F40}" destId="{2E3E1793-7BCD-4E05-8DEB-C949BC343643}" srcOrd="0" destOrd="0" presId="urn:microsoft.com/office/officeart/2005/8/layout/cycle5"/>
+    <dgm:cxn modelId="{77D95732-6FCD-4B5B-A73D-AED6F4D3652A}" type="presOf" srcId="{EA98387A-89AA-43AF-8DB5-16E3A11849D7}" destId="{297F8660-F777-4497-8254-50A29AA0497B}" srcOrd="0" destOrd="0" presId="urn:microsoft.com/office/officeart/2005/8/layout/cycle5"/>
+    <dgm:cxn modelId="{7FE3ADC0-C8CD-4C32-BAAB-863278ECE473}" type="presOf" srcId="{6A946480-B202-4C83-907D-1E7D463DB7FE}" destId="{89857E5E-069A-437F-A4AD-A43E3AAD499C}" srcOrd="0" destOrd="0" presId="urn:microsoft.com/office/officeart/2005/8/layout/cycle5"/>
+    <dgm:cxn modelId="{72B7C9E2-959C-4B38-BEBF-0C11BC82F9E5}" type="presOf" srcId="{5168574B-868E-44A6-B6E1-0126FBA50935}" destId="{6222376B-A611-4BFF-A62F-963433A3CF5A}" srcOrd="0" destOrd="0" presId="urn:microsoft.com/office/officeart/2005/8/layout/cycle5"/>
+    <dgm:cxn modelId="{FD45E8E3-F0E3-454F-AF89-0EAA72541B3A}" type="presOf" srcId="{842EDCCB-4B10-4649-AFEE-FBA98B9B21BC}" destId="{5C7EE4B1-4898-4B7C-9DE1-A0EC78F54EDE}" srcOrd="0" destOrd="0" presId="urn:microsoft.com/office/officeart/2005/8/layout/cycle5"/>
     <dgm:cxn modelId="{41E1E77E-F043-4DBD-AFBE-EB48784C3D3D}" srcId="{9C6D5CE4-86D8-4664-9A20-DC92DA18EE08}" destId="{2EBE1526-034E-4846-BA5B-7E67FD940F40}" srcOrd="0" destOrd="0" parTransId="{558FE27A-589D-45FA-AA6E-816B18699CEB}" sibTransId="{EFCA5423-9B82-419C-9560-4478FC8BAA06}"/>
+    <dgm:cxn modelId="{AFE96741-B3BD-46A7-937A-FF77E0D85716}" type="presOf" srcId="{FD442C12-20BF-4F71-9045-341C950E77ED}" destId="{242F59CC-6117-43D5-8FE7-7065192DA727}" srcOrd="0" destOrd="0" presId="urn:microsoft.com/office/officeart/2005/8/layout/cycle5"/>
+    <dgm:cxn modelId="{F4894CFA-D545-4B6A-98C6-C94BF44587CA}" srcId="{9C6D5CE4-86D8-4664-9A20-DC92DA18EE08}" destId="{EA98387A-89AA-43AF-8DB5-16E3A11849D7}" srcOrd="5" destOrd="0" parTransId="{81E2769A-C23B-476B-9E64-192BD49BBEB7}" sibTransId="{69DF6F6F-4636-4FAB-B22A-52FB336A356B}"/>
+    <dgm:cxn modelId="{78BE3338-D950-4E82-8551-2A76F2C486D1}" type="presOf" srcId="{4DE6D936-E174-4051-B1D8-1BDDF24DB5F8}" destId="{6B80934C-B27F-4DB7-ADE5-C1F560483D98}" srcOrd="0" destOrd="0" presId="urn:microsoft.com/office/officeart/2005/8/layout/cycle5"/>
+    <dgm:cxn modelId="{BE3096D7-EDD6-4C0F-9964-624DC8672762}" type="presOf" srcId="{7C389107-6123-41DD-ABD8-3853D285C045}" destId="{CDF45B74-43D1-4864-8587-D1FAAB443F2E}" srcOrd="0" destOrd="0" presId="urn:microsoft.com/office/officeart/2005/8/layout/cycle5"/>
+    <dgm:cxn modelId="{A9383A7A-D771-4306-99FC-7D7FA81E5B9F}" srcId="{9C6D5CE4-86D8-4664-9A20-DC92DA18EE08}" destId="{1577B942-6ECA-4880-9B51-4038D7D84263}" srcOrd="3" destOrd="0" parTransId="{C0D02308-FD23-433B-9EBC-109862AF9F79}" sibTransId="{5168574B-868E-44A6-B6E1-0126FBA50935}"/>
+    <dgm:cxn modelId="{1430A7A4-244D-4FB9-87B9-FBA75682A60E}" type="presOf" srcId="{E70761AC-F5FD-4E3F-B9B3-570C3DB3E6F1}" destId="{1BF5A066-6D81-43E7-9526-E4A444BFC176}" srcOrd="0" destOrd="0" presId="urn:microsoft.com/office/officeart/2005/8/layout/cycle5"/>
+    <dgm:cxn modelId="{1F896BBD-78A0-44F1-AF75-3B496C8B267F}" type="presOf" srcId="{3E2957FF-C442-4087-8D6B-F5C91D7FDAD9}" destId="{DB534CCA-AE08-4581-ACCD-A09DBD19921E}" srcOrd="0" destOrd="0" presId="urn:microsoft.com/office/officeart/2005/8/layout/cycle5"/>
+    <dgm:cxn modelId="{08A35419-645A-491D-B5F4-22E1A015C7DF}" type="presOf" srcId="{28B43E1A-3839-4C4D-8F80-935F2F9719D0}" destId="{BD598EA8-E28E-4209-94DF-EB5A37FA7F79}" srcOrd="0" destOrd="0" presId="urn:microsoft.com/office/officeart/2005/8/layout/cycle5"/>
+    <dgm:cxn modelId="{E9F461CC-30C9-488E-A233-E5461DA84F52}" type="presOf" srcId="{1577B942-6ECA-4880-9B51-4038D7D84263}" destId="{3386A11E-F2B4-4DCD-B506-A33E427E71A9}" srcOrd="0" destOrd="0" presId="urn:microsoft.com/office/officeart/2005/8/layout/cycle5"/>
+    <dgm:cxn modelId="{4ED7FA45-F1A1-41B8-B1CA-07F2BC6A2149}" type="presOf" srcId="{9C6D5CE4-86D8-4664-9A20-DC92DA18EE08}" destId="{4E743305-1674-4BDB-9931-68209537AA53}" srcOrd="0" destOrd="0" presId="urn:microsoft.com/office/officeart/2005/8/layout/cycle5"/>
+    <dgm:cxn modelId="{61A29AE2-48D8-428E-85E2-BED76048C137}" type="presOf" srcId="{DFDACCFF-42CC-4B9B-8D93-6006CBD8456B}" destId="{78D7A4A0-C52A-4593-ADC7-373B3AA24A05}" srcOrd="0" destOrd="0" presId="urn:microsoft.com/office/officeart/2005/8/layout/cycle5"/>
     <dgm:cxn modelId="{9852A694-E846-48C9-9969-F14E18393BD0}" srcId="{9C6D5CE4-86D8-4664-9A20-DC92DA18EE08}" destId="{6A946480-B202-4C83-907D-1E7D463DB7FE}" srcOrd="4" destOrd="0" parTransId="{916AA518-F6E0-4CF4-AD04-E020B40F24A4}" sibTransId="{842EDCCB-4B10-4649-AFEE-FBA98B9B21BC}"/>
-    <dgm:cxn modelId="{61A29AE2-48D8-428E-85E2-BED76048C137}" type="presOf" srcId="{DFDACCFF-42CC-4B9B-8D93-6006CBD8456B}" destId="{78D7A4A0-C52A-4593-ADC7-373B3AA24A05}" srcOrd="0" destOrd="0" presId="urn:microsoft.com/office/officeart/2005/8/layout/cycle5"/>
-    <dgm:cxn modelId="{BE3096D7-EDD6-4C0F-9964-624DC8672762}" type="presOf" srcId="{7C389107-6123-41DD-ABD8-3853D285C045}" destId="{CDF45B74-43D1-4864-8587-D1FAAB443F2E}" srcOrd="0" destOrd="0" presId="urn:microsoft.com/office/officeart/2005/8/layout/cycle5"/>
-    <dgm:cxn modelId="{B9876142-B23B-4347-A968-842F8114BD52}" srcId="{9C6D5CE4-86D8-4664-9A20-DC92DA18EE08}" destId="{4DE6D936-E174-4051-B1D8-1BDDF24DB5F8}" srcOrd="6" destOrd="0" parTransId="{C9F1BA76-0055-4B26-A0A4-7EA152022C36}" sibTransId="{E70761AC-F5FD-4E3F-B9B3-570C3DB3E6F1}"/>
-    <dgm:cxn modelId="{77D95732-6FCD-4B5B-A73D-AED6F4D3652A}" type="presOf" srcId="{EA98387A-89AA-43AF-8DB5-16E3A11849D7}" destId="{297F8660-F777-4497-8254-50A29AA0497B}" srcOrd="0" destOrd="0" presId="urn:microsoft.com/office/officeart/2005/8/layout/cycle5"/>
-    <dgm:cxn modelId="{78BE3338-D950-4E82-8551-2A76F2C486D1}" type="presOf" srcId="{4DE6D936-E174-4051-B1D8-1BDDF24DB5F8}" destId="{6B80934C-B27F-4DB7-ADE5-C1F560483D98}" srcOrd="0" destOrd="0" presId="urn:microsoft.com/office/officeart/2005/8/layout/cycle5"/>
+    <dgm:cxn modelId="{FA0A59D8-DD9A-4CCD-8C7B-28CC0C5576C0}" type="presOf" srcId="{69DF6F6F-4636-4FAB-B22A-52FB336A356B}" destId="{5F10BEA9-A78E-43DB-B73B-503C391A832F}" srcOrd="0" destOrd="0" presId="urn:microsoft.com/office/officeart/2005/8/layout/cycle5"/>
+    <dgm:cxn modelId="{1449721F-321E-4D2E-913D-8F348FF33FA7}" srcId="{9C6D5CE4-86D8-4664-9A20-DC92DA18EE08}" destId="{28B43E1A-3839-4C4D-8F80-935F2F9719D0}" srcOrd="7" destOrd="0" parTransId="{D75DE74E-DE2F-4A09-8BAA-DFFBB782FE12}" sibTransId="{3E2957FF-C442-4087-8D6B-F5C91D7FDAD9}"/>
     <dgm:cxn modelId="{EC1A368D-29B5-40E1-914E-DDF9A66808FC}" type="presOf" srcId="{EFCA5423-9B82-419C-9560-4478FC8BAA06}" destId="{D9A75A5C-A763-48CB-9D34-226AE0D7AFDA}" srcOrd="0" destOrd="0" presId="urn:microsoft.com/office/officeart/2005/8/layout/cycle5"/>
-    <dgm:cxn modelId="{FA0A59D8-DD9A-4CCD-8C7B-28CC0C5576C0}" type="presOf" srcId="{69DF6F6F-4636-4FAB-B22A-52FB336A356B}" destId="{5F10BEA9-A78E-43DB-B73B-503C391A832F}" srcOrd="0" destOrd="0" presId="urn:microsoft.com/office/officeart/2005/8/layout/cycle5"/>
-    <dgm:cxn modelId="{08A35419-645A-491D-B5F4-22E1A015C7DF}" type="presOf" srcId="{28B43E1A-3839-4C4D-8F80-935F2F9719D0}" destId="{BD598EA8-E28E-4209-94DF-EB5A37FA7F79}" srcOrd="0" destOrd="0" presId="urn:microsoft.com/office/officeart/2005/8/layout/cycle5"/>
-    <dgm:cxn modelId="{1F896BBD-78A0-44F1-AF75-3B496C8B267F}" type="presOf" srcId="{3E2957FF-C442-4087-8D6B-F5C91D7FDAD9}" destId="{DB534CCA-AE08-4581-ACCD-A09DBD19921E}" srcOrd="0" destOrd="0" presId="urn:microsoft.com/office/officeart/2005/8/layout/cycle5"/>
-    <dgm:cxn modelId="{4ED7FA45-F1A1-41B8-B1CA-07F2BC6A2149}" type="presOf" srcId="{9C6D5CE4-86D8-4664-9A20-DC92DA18EE08}" destId="{4E743305-1674-4BDB-9931-68209537AA53}" srcOrd="0" destOrd="0" presId="urn:microsoft.com/office/officeart/2005/8/layout/cycle5"/>
-    <dgm:cxn modelId="{1449721F-321E-4D2E-913D-8F348FF33FA7}" srcId="{9C6D5CE4-86D8-4664-9A20-DC92DA18EE08}" destId="{28B43E1A-3839-4C4D-8F80-935F2F9719D0}" srcOrd="7" destOrd="0" parTransId="{D75DE74E-DE2F-4A09-8BAA-DFFBB782FE12}" sibTransId="{3E2957FF-C442-4087-8D6B-F5C91D7FDAD9}"/>
-    <dgm:cxn modelId="{E9F461CC-30C9-488E-A233-E5461DA84F52}" type="presOf" srcId="{1577B942-6ECA-4880-9B51-4038D7D84263}" destId="{3386A11E-F2B4-4DCD-B506-A33E427E71A9}" srcOrd="0" destOrd="0" presId="urn:microsoft.com/office/officeart/2005/8/layout/cycle5"/>
-    <dgm:cxn modelId="{1F38BCFE-0D44-4AF3-A144-FB4842AF5D9A}" type="presOf" srcId="{2EBE1526-034E-4846-BA5B-7E67FD940F40}" destId="{2E3E1793-7BCD-4E05-8DEB-C949BC343643}" srcOrd="0" destOrd="0" presId="urn:microsoft.com/office/officeart/2005/8/layout/cycle5"/>
-    <dgm:cxn modelId="{264287FB-723D-42A6-AEBD-F6231388F8B8}" srcId="{9C6D5CE4-86D8-4664-9A20-DC92DA18EE08}" destId="{4AA12DA5-20BB-44FB-966A-ED64A8FDC723}" srcOrd="1" destOrd="0" parTransId="{1BA64373-1244-4343-AF96-187B5FB4BCF4}" sibTransId="{7C389107-6123-41DD-ABD8-3853D285C045}"/>
-    <dgm:cxn modelId="{F4894CFA-D545-4B6A-98C6-C94BF44587CA}" srcId="{9C6D5CE4-86D8-4664-9A20-DC92DA18EE08}" destId="{EA98387A-89AA-43AF-8DB5-16E3A11849D7}" srcOrd="5" destOrd="0" parTransId="{81E2769A-C23B-476B-9E64-192BD49BBEB7}" sibTransId="{69DF6F6F-4636-4FAB-B22A-52FB336A356B}"/>
-    <dgm:cxn modelId="{CB6D9968-05A6-4AC1-83CB-94D4DDF2D426}" type="presOf" srcId="{4AA12DA5-20BB-44FB-966A-ED64A8FDC723}" destId="{3E08DC01-4D3A-4D19-B9F8-0C1143F8B68A}" srcOrd="0" destOrd="0" presId="urn:microsoft.com/office/officeart/2005/8/layout/cycle5"/>
-    <dgm:cxn modelId="{72B7C9E2-959C-4B38-BEBF-0C11BC82F9E5}" type="presOf" srcId="{5168574B-868E-44A6-B6E1-0126FBA50935}" destId="{6222376B-A611-4BFF-A62F-963433A3CF5A}" srcOrd="0" destOrd="0" presId="urn:microsoft.com/office/officeart/2005/8/layout/cycle5"/>
-    <dgm:cxn modelId="{1430A7A4-244D-4FB9-87B9-FBA75682A60E}" type="presOf" srcId="{E70761AC-F5FD-4E3F-B9B3-570C3DB3E6F1}" destId="{1BF5A066-6D81-43E7-9526-E4A444BFC176}" srcOrd="0" destOrd="0" presId="urn:microsoft.com/office/officeart/2005/8/layout/cycle5"/>
-    <dgm:cxn modelId="{AFE96741-B3BD-46A7-937A-FF77E0D85716}" type="presOf" srcId="{FD442C12-20BF-4F71-9045-341C950E77ED}" destId="{242F59CC-6117-43D5-8FE7-7065192DA727}" srcOrd="0" destOrd="0" presId="urn:microsoft.com/office/officeart/2005/8/layout/cycle5"/>
-    <dgm:cxn modelId="{FD45E8E3-F0E3-454F-AF89-0EAA72541B3A}" type="presOf" srcId="{842EDCCB-4B10-4649-AFEE-FBA98B9B21BC}" destId="{5C7EE4B1-4898-4B7C-9DE1-A0EC78F54EDE}" srcOrd="0" destOrd="0" presId="urn:microsoft.com/office/officeart/2005/8/layout/cycle5"/>
-    <dgm:cxn modelId="{A9383A7A-D771-4306-99FC-7D7FA81E5B9F}" srcId="{9C6D5CE4-86D8-4664-9A20-DC92DA18EE08}" destId="{1577B942-6ECA-4880-9B51-4038D7D84263}" srcOrd="3" destOrd="0" parTransId="{C0D02308-FD23-433B-9EBC-109862AF9F79}" sibTransId="{5168574B-868E-44A6-B6E1-0126FBA50935}"/>
-    <dgm:cxn modelId="{7FE3ADC0-C8CD-4C32-BAAB-863278ECE473}" type="presOf" srcId="{6A946480-B202-4C83-907D-1E7D463DB7FE}" destId="{89857E5E-069A-437F-A4AD-A43E3AAD499C}" srcOrd="0" destOrd="0" presId="urn:microsoft.com/office/officeart/2005/8/layout/cycle5"/>
-    <dgm:cxn modelId="{57491815-AFA0-4A87-9628-EFCBCEEDFEDF}" srcId="{9C6D5CE4-86D8-4664-9A20-DC92DA18EE08}" destId="{DFDACCFF-42CC-4B9B-8D93-6006CBD8456B}" srcOrd="2" destOrd="0" parTransId="{4E7C24F4-A9F5-4B43-92B7-FB0F7B0F8248}" sibTransId="{FD442C12-20BF-4F71-9045-341C950E77ED}"/>
     <dgm:cxn modelId="{108A734A-FC57-42C1-921A-50AFCAC081B3}" type="presParOf" srcId="{4E743305-1674-4BDB-9931-68209537AA53}" destId="{2E3E1793-7BCD-4E05-8DEB-C949BC343643}" srcOrd="0" destOrd="0" presId="urn:microsoft.com/office/officeart/2005/8/layout/cycle5"/>
     <dgm:cxn modelId="{B25FC01B-6856-452D-9413-E939C33C877E}" type="presParOf" srcId="{4E743305-1674-4BDB-9931-68209537AA53}" destId="{839FB470-B514-47D8-A87D-90971D435E82}" srcOrd="1" destOrd="0" presId="urn:microsoft.com/office/officeart/2005/8/layout/cycle5"/>
     <dgm:cxn modelId="{8776D728-6048-4A1C-AC77-A7FF211C702E}" type="presParOf" srcId="{4E743305-1674-4BDB-9931-68209537AA53}" destId="{D9A75A5C-A763-48CB-9D34-226AE0D7AFDA}" srcOrd="2" destOrd="0" presId="urn:microsoft.com/office/officeart/2005/8/layout/cycle5"/>
@@ -18867,14 +18868,14 @@
   <dgm:whole/>
   <dgm:extLst>
     <a:ext uri="http://schemas.microsoft.com/office/drawing/2008/diagram">
-      <dsp:dataModelExt xmlns:dsp="http://schemas.microsoft.com/office/drawing/2008/diagram" relId="rId6" minVer="http://schemas.openxmlformats.org/drawingml/2006/diagram"/>
+      <dsp:dataModelExt xmlns:dsp="http://schemas.microsoft.com/office/drawing/2008/diagram" xmlns="" relId="rId6" minVer="http://schemas.openxmlformats.org/drawingml/2006/diagram"/>
     </a:ext>
   </dgm:extLst>
 </dgm:dataModel>
 </file>
 
 <file path=ppt/diagrams/drawing1.xml><?xml version="1.0" encoding="utf-8"?>
-<dsp:drawing xmlns:dgm="http://schemas.openxmlformats.org/drawingml/2006/diagram" xmlns:dsp="http://schemas.microsoft.com/office/drawing/2008/diagram" xmlns:a="http://schemas.openxmlformats.org/drawingml/2006/main">
+<dsp:drawing xmlns:dgm="http://schemas.openxmlformats.org/drawingml/2006/diagram" xmlns:a="http://schemas.openxmlformats.org/drawingml/2006/main" xmlns:dsp="http://schemas.microsoft.com/office/drawing/2008/diagram">
   <dsp:spTree>
     <dsp:nvGrpSpPr>
       <dsp:cNvPr id="0" name=""/>
@@ -18986,8 +18987,8 @@
         </a:p>
       </dsp:txBody>
       <dsp:txXfrm>
-        <a:off x="9109921" y="95057"/>
-        <a:ext cx="2582756" cy="1617538"/>
+        <a:off x="9022416" y="7552"/>
+        <a:ext cx="2757766" cy="1792548"/>
       </dsp:txXfrm>
     </dsp:sp>
     <dsp:sp modelId="{D9A75A5C-A763-48CB-9D34-226AE0D7AFDA}">
@@ -19148,8 +19149,8 @@
         </a:p>
       </dsp:txBody>
       <dsp:txXfrm>
-        <a:off x="13508743" y="1917109"/>
-        <a:ext cx="2582756" cy="1617538"/>
+        <a:off x="13421238" y="1829604"/>
+        <a:ext cx="2757766" cy="1792548"/>
       </dsp:txXfrm>
     </dsp:sp>
     <dsp:sp modelId="{CDF45B74-43D1-4864-8587-D1FAAB443F2E}">
@@ -19310,8 +19311,8 @@
         </a:p>
       </dsp:txBody>
       <dsp:txXfrm>
-        <a:off x="15330794" y="6315930"/>
-        <a:ext cx="2582756" cy="1617538"/>
+        <a:off x="15243289" y="6228425"/>
+        <a:ext cx="2757766" cy="1792548"/>
       </dsp:txXfrm>
     </dsp:sp>
     <dsp:sp modelId="{242F59CC-6117-43D5-8FE7-7065192DA727}">
@@ -19472,8 +19473,8 @@
         </a:p>
       </dsp:txBody>
       <dsp:txXfrm>
-        <a:off x="13508743" y="10714752"/>
-        <a:ext cx="2582756" cy="1617538"/>
+        <a:off x="13421238" y="10627247"/>
+        <a:ext cx="2757766" cy="1792548"/>
       </dsp:txXfrm>
     </dsp:sp>
     <dsp:sp modelId="{6222376B-A611-4BFF-A62F-963433A3CF5A}">
@@ -19634,8 +19635,8 @@
         </a:p>
       </dsp:txBody>
       <dsp:txXfrm>
-        <a:off x="9109921" y="12279508"/>
-        <a:ext cx="2582756" cy="1617538"/>
+        <a:off x="9022416" y="12192003"/>
+        <a:ext cx="2757766" cy="1792548"/>
       </dsp:txXfrm>
     </dsp:sp>
     <dsp:sp modelId="{5C7EE4B1-4898-4B7C-9DE1-A0EC78F54EDE}">
@@ -19790,22 +19791,14 @@
           </a:pPr>
           <a:r>
             <a:rPr lang="en-US" sz="2600" kern="1200" dirty="0" smtClean="0"/>
-            <a:t>Robot Server </a:t>
-          </a:r>
-          <a:r>
-            <a:rPr lang="en-US" sz="2600" kern="1200" dirty="0" smtClean="0"/>
-            <a:t>receives food </a:t>
-          </a:r>
-          <a:r>
-            <a:rPr lang="en-US" sz="2600" kern="1200" dirty="0" smtClean="0"/>
-            <a:t>from robot arm</a:t>
+            <a:t>Robot Server receives food from robot arm</a:t>
           </a:r>
           <a:endParaRPr lang="en-US" sz="2600" kern="1200" dirty="0"/>
         </a:p>
       </dsp:txBody>
       <dsp:txXfrm>
-        <a:off x="4711100" y="10714752"/>
-        <a:ext cx="2582756" cy="1617538"/>
+        <a:off x="4623595" y="10627247"/>
+        <a:ext cx="2757766" cy="1792548"/>
       </dsp:txXfrm>
     </dsp:sp>
     <dsp:sp modelId="{5F10BEA9-A78E-43DB-B73B-503C391A832F}">
@@ -19966,8 +19959,8 @@
         </a:p>
       </dsp:txBody>
       <dsp:txXfrm>
-        <a:off x="2889048" y="6315930"/>
-        <a:ext cx="2582756" cy="1617538"/>
+        <a:off x="2801543" y="6228425"/>
+        <a:ext cx="2757766" cy="1792548"/>
       </dsp:txXfrm>
     </dsp:sp>
     <dsp:sp modelId="{1BF5A066-6D81-43E7-9526-E4A444BFC176}">
@@ -20128,8 +20121,8 @@
         </a:p>
       </dsp:txBody>
       <dsp:txXfrm>
-        <a:off x="4711100" y="1917109"/>
-        <a:ext cx="2582756" cy="1617538"/>
+        <a:off x="4623595" y="1829604"/>
+        <a:ext cx="2757766" cy="1792548"/>
       </dsp:txXfrm>
     </dsp:sp>
     <dsp:sp modelId="{DB534CCA-AE08-4581-ACCD-A09DBD19921E}">
@@ -21638,6 +21631,7 @@
           <a:p>
             <a:fld id="{05B0FE1D-F90F-4215-A04E-F5C127757506}" type="datetimeFigureOut">
               <a:rPr lang="en-US" smtClean="0"/>
+              <a:pPr/>
               <a:t>4/27/2015</a:t>
             </a:fld>
             <a:endParaRPr lang="en-US"/>
@@ -21680,6 +21674,7 @@
           <a:p>
             <a:fld id="{68AEE10B-E330-42A2-9AA6-B5903F05CA40}" type="slidenum">
               <a:rPr lang="en-US" smtClean="0"/>
+              <a:pPr/>
               <a:t>‹#›</a:t>
             </a:fld>
             <a:endParaRPr lang="en-US"/>
@@ -21803,6 +21798,7 @@
           <a:p>
             <a:fld id="{05B0FE1D-F90F-4215-A04E-F5C127757506}" type="datetimeFigureOut">
               <a:rPr lang="en-US" smtClean="0"/>
+              <a:pPr/>
               <a:t>4/27/2015</a:t>
             </a:fld>
             <a:endParaRPr lang="en-US"/>
@@ -21845,6 +21841,7 @@
           <a:p>
             <a:fld id="{68AEE10B-E330-42A2-9AA6-B5903F05CA40}" type="slidenum">
               <a:rPr lang="en-US" smtClean="0"/>
+              <a:pPr/>
               <a:t>‹#›</a:t>
             </a:fld>
             <a:endParaRPr lang="en-US"/>
@@ -21978,6 +21975,7 @@
           <a:p>
             <a:fld id="{05B0FE1D-F90F-4215-A04E-F5C127757506}" type="datetimeFigureOut">
               <a:rPr lang="en-US" smtClean="0"/>
+              <a:pPr/>
               <a:t>4/27/2015</a:t>
             </a:fld>
             <a:endParaRPr lang="en-US"/>
@@ -22020,6 +22018,7 @@
           <a:p>
             <a:fld id="{68AEE10B-E330-42A2-9AA6-B5903F05CA40}" type="slidenum">
               <a:rPr lang="en-US" smtClean="0"/>
+              <a:pPr/>
               <a:t>‹#›</a:t>
             </a:fld>
             <a:endParaRPr lang="en-US"/>
@@ -22143,6 +22142,7 @@
           <a:p>
             <a:fld id="{05B0FE1D-F90F-4215-A04E-F5C127757506}" type="datetimeFigureOut">
               <a:rPr lang="en-US" smtClean="0"/>
+              <a:pPr/>
               <a:t>4/27/2015</a:t>
             </a:fld>
             <a:endParaRPr lang="en-US"/>
@@ -22185,6 +22185,7 @@
           <a:p>
             <a:fld id="{68AEE10B-E330-42A2-9AA6-B5903F05CA40}" type="slidenum">
               <a:rPr lang="en-US" smtClean="0"/>
+              <a:pPr/>
               <a:t>‹#›</a:t>
             </a:fld>
             <a:endParaRPr lang="en-US"/>
@@ -22384,6 +22385,7 @@
           <a:p>
             <a:fld id="{05B0FE1D-F90F-4215-A04E-F5C127757506}" type="datetimeFigureOut">
               <a:rPr lang="en-US" smtClean="0"/>
+              <a:pPr/>
               <a:t>4/27/2015</a:t>
             </a:fld>
             <a:endParaRPr lang="en-US"/>
@@ -22426,6 +22428,7 @@
           <a:p>
             <a:fld id="{68AEE10B-E330-42A2-9AA6-B5903F05CA40}" type="slidenum">
               <a:rPr lang="en-US" smtClean="0"/>
+              <a:pPr/>
               <a:t>‹#›</a:t>
             </a:fld>
             <a:endParaRPr lang="en-US"/>
@@ -22667,6 +22670,7 @@
           <a:p>
             <a:fld id="{05B0FE1D-F90F-4215-A04E-F5C127757506}" type="datetimeFigureOut">
               <a:rPr lang="en-US" smtClean="0"/>
+              <a:pPr/>
               <a:t>4/27/2015</a:t>
             </a:fld>
             <a:endParaRPr lang="en-US"/>
@@ -22709,6 +22713,7 @@
           <a:p>
             <a:fld id="{68AEE10B-E330-42A2-9AA6-B5903F05CA40}" type="slidenum">
               <a:rPr lang="en-US" smtClean="0"/>
+              <a:pPr/>
               <a:t>‹#›</a:t>
             </a:fld>
             <a:endParaRPr lang="en-US"/>
@@ -23089,6 +23094,7 @@
           <a:p>
             <a:fld id="{05B0FE1D-F90F-4215-A04E-F5C127757506}" type="datetimeFigureOut">
               <a:rPr lang="en-US" smtClean="0"/>
+              <a:pPr/>
               <a:t>4/27/2015</a:t>
             </a:fld>
             <a:endParaRPr lang="en-US"/>
@@ -23131,6 +23137,7 @@
           <a:p>
             <a:fld id="{68AEE10B-E330-42A2-9AA6-B5903F05CA40}" type="slidenum">
               <a:rPr lang="en-US" smtClean="0"/>
+              <a:pPr/>
               <a:t>‹#›</a:t>
             </a:fld>
             <a:endParaRPr lang="en-US"/>
@@ -23202,6 +23209,7 @@
           <a:p>
             <a:fld id="{05B0FE1D-F90F-4215-A04E-F5C127757506}" type="datetimeFigureOut">
               <a:rPr lang="en-US" smtClean="0"/>
+              <a:pPr/>
               <a:t>4/27/2015</a:t>
             </a:fld>
             <a:endParaRPr lang="en-US"/>
@@ -23244,6 +23252,7 @@
           <a:p>
             <a:fld id="{68AEE10B-E330-42A2-9AA6-B5903F05CA40}" type="slidenum">
               <a:rPr lang="en-US" smtClean="0"/>
+              <a:pPr/>
               <a:t>‹#›</a:t>
             </a:fld>
             <a:endParaRPr lang="en-US"/>
@@ -23292,6 +23301,7 @@
           <a:p>
             <a:fld id="{05B0FE1D-F90F-4215-A04E-F5C127757506}" type="datetimeFigureOut">
               <a:rPr lang="en-US" smtClean="0"/>
+              <a:pPr/>
               <a:t>4/27/2015</a:t>
             </a:fld>
             <a:endParaRPr lang="en-US"/>
@@ -23334,6 +23344,7 @@
           <a:p>
             <a:fld id="{68AEE10B-E330-42A2-9AA6-B5903F05CA40}" type="slidenum">
               <a:rPr lang="en-US" smtClean="0"/>
+              <a:pPr/>
               <a:t>‹#›</a:t>
             </a:fld>
             <a:endParaRPr lang="en-US"/>
@@ -23564,6 +23575,7 @@
           <a:p>
             <a:fld id="{05B0FE1D-F90F-4215-A04E-F5C127757506}" type="datetimeFigureOut">
               <a:rPr lang="en-US" smtClean="0"/>
+              <a:pPr/>
               <a:t>4/27/2015</a:t>
             </a:fld>
             <a:endParaRPr lang="en-US"/>
@@ -23606,6 +23618,7 @@
           <a:p>
             <a:fld id="{68AEE10B-E330-42A2-9AA6-B5903F05CA40}" type="slidenum">
               <a:rPr lang="en-US" smtClean="0"/>
+              <a:pPr/>
               <a:t>‹#›</a:t>
             </a:fld>
             <a:endParaRPr lang="en-US"/>
@@ -23812,6 +23825,7 @@
           <a:p>
             <a:fld id="{05B0FE1D-F90F-4215-A04E-F5C127757506}" type="datetimeFigureOut">
               <a:rPr lang="en-US" smtClean="0"/>
+              <a:pPr/>
               <a:t>4/27/2015</a:t>
             </a:fld>
             <a:endParaRPr lang="en-US"/>
@@ -23854,6 +23868,7 @@
           <a:p>
             <a:fld id="{68AEE10B-E330-42A2-9AA6-B5903F05CA40}" type="slidenum">
               <a:rPr lang="en-US" smtClean="0"/>
+              <a:pPr/>
               <a:t>‹#›</a:t>
             </a:fld>
             <a:endParaRPr lang="en-US"/>
@@ -24020,6 +24035,7 @@
           <a:p>
             <a:fld id="{05B0FE1D-F90F-4215-A04E-F5C127757506}" type="datetimeFigureOut">
               <a:rPr lang="en-US" smtClean="0"/>
+              <a:pPr/>
               <a:t>4/27/2015</a:t>
             </a:fld>
             <a:endParaRPr lang="en-US"/>
@@ -24098,6 +24114,7 @@
           <a:p>
             <a:fld id="{68AEE10B-E330-42A2-9AA6-B5903F05CA40}" type="slidenum">
               <a:rPr lang="en-US" smtClean="0"/>
+              <a:pPr/>
               <a:t>‹#›</a:t>
             </a:fld>
             <a:endParaRPr lang="en-US"/>
@@ -24397,7 +24414,7 @@
           <p:nvPr>
             <p:extLst>
               <p:ext uri="{D42A27DB-BD31-4B8C-83A1-F6EECF244321}">
-                <p14:modId xmlns:p14="http://schemas.microsoft.com/office/powerpoint/2010/main" val="2922933472"/>
+                <p14:modId xmlns:p14="http://schemas.microsoft.com/office/powerpoint/2010/main" xmlns="" val="2922933472"/>
               </p:ext>
             </p:extLst>
           </p:nvPr>
@@ -24688,15 +24705,7 @@
             </a:pPr>
             <a:r>
               <a:rPr lang="en-US" sz="3200" dirty="0" smtClean="0"/>
-              <a:t>Closest customer first </a:t>
-            </a:r>
-            <a:r>
-              <a:rPr lang="en-US" sz="3200" dirty="0" smtClean="0"/>
-              <a:t>(requested </a:t>
-            </a:r>
-            <a:r>
-              <a:rPr lang="en-US" sz="3200" dirty="0" smtClean="0"/>
-              <a:t>to serve)</a:t>
+              <a:t>Closest customer first (requested to serve)</a:t>
             </a:r>
           </a:p>
           <a:p>
@@ -24726,19 +24735,7 @@
             </a:pPr>
             <a:r>
               <a:rPr lang="en-US" sz="3200" dirty="0" smtClean="0"/>
-              <a:t>Same </a:t>
-            </a:r>
-            <a:r>
-              <a:rPr lang="en-US" sz="3200" dirty="0" smtClean="0"/>
-              <a:t>I and </a:t>
-            </a:r>
-            <a:r>
-              <a:rPr lang="en-US" sz="3200" dirty="0" smtClean="0"/>
-              <a:t>III as Robot </a:t>
-            </a:r>
-            <a:r>
-              <a:rPr lang="en-US" sz="3200" dirty="0" smtClean="0"/>
-              <a:t>Waiter</a:t>
+              <a:t>Same I and III as Robot Waiter</a:t>
             </a:r>
           </a:p>
           <a:p>
@@ -24750,7 +24747,6 @@
               <a:rPr lang="en-US" sz="3200" dirty="0" smtClean="0"/>
               <a:t>FIFO customer service</a:t>
             </a:r>
-            <a:endParaRPr lang="en-US" sz="3200" dirty="0" smtClean="0"/>
           </a:p>
           <a:p>
             <a:pPr marL="2467234" lvl="1" indent="-742950">
@@ -24799,11 +24795,7 @@
             </a:pPr>
             <a:r>
               <a:rPr lang="en-US" sz="3200" dirty="0" smtClean="0"/>
-              <a:t>Robot </a:t>
-            </a:r>
-            <a:r>
-              <a:rPr lang="en-US" sz="3200" dirty="0" smtClean="0"/>
-              <a:t>Hierarchy :  Determines which robot has to move out of the way (lowest moves)</a:t>
+              <a:t>Robot Hierarchy :  Determines which robot has to move out of the way (lowest moves)</a:t>
             </a:r>
           </a:p>
           <a:p>
@@ -24815,7 +24807,6 @@
               <a:rPr lang="en-US" sz="3200" dirty="0" smtClean="0"/>
               <a:t>Servers (numerically ordered)</a:t>
             </a:r>
-            <a:endParaRPr lang="en-US" sz="3200" dirty="0" smtClean="0"/>
           </a:p>
           <a:p>
             <a:pPr marL="2467234" lvl="1" indent="-742950">
@@ -24859,43 +24850,7 @@
             <a:pPr algn="just"/>
             <a:r>
               <a:rPr lang="en-US" sz="3200" dirty="0" smtClean="0"/>
-              <a:t>In our world, </a:t>
-            </a:r>
-            <a:r>
-              <a:rPr lang="en-US" sz="3200" dirty="0" smtClean="0"/>
-              <a:t>customers appear at the door </a:t>
-            </a:r>
-            <a:r>
-              <a:rPr lang="en-US" sz="3200" dirty="0" smtClean="0"/>
-              <a:t>given</a:t>
-            </a:r>
-            <a:r>
-              <a:rPr lang="en-US" sz="3200" dirty="0" smtClean="0"/>
-              <a:t> </a:t>
-            </a:r>
-            <a:r>
-              <a:rPr lang="en-US" sz="3200" dirty="0" smtClean="0"/>
-              <a:t>a random change every world step.  They then randomly depth-first search for an open table. They request a burger after </a:t>
-            </a:r>
-            <a:r>
-              <a:rPr lang="en-US" sz="3200" dirty="0" smtClean="0"/>
-              <a:t>being asked a </a:t>
-            </a:r>
-            <a:r>
-              <a:rPr lang="en-US" sz="3200" dirty="0" smtClean="0"/>
-              <a:t>random </a:t>
-            </a:r>
-            <a:r>
-              <a:rPr lang="en-US" sz="3200" dirty="0" smtClean="0"/>
-              <a:t>number of </a:t>
-            </a:r>
-            <a:r>
-              <a:rPr lang="en-US" sz="3200" dirty="0" smtClean="0"/>
-              <a:t>times by </a:t>
-            </a:r>
-            <a:r>
-              <a:rPr lang="en-US" sz="3200" dirty="0" smtClean="0"/>
-              <a:t>the waiter. </a:t>
+              <a:t>In our world, customers appear at the door given a random change every world step.  They then randomly depth-first search for an open table. They request a burger after being asked a random number of times by the waiter. </a:t>
             </a:r>
             <a:r>
               <a:rPr lang="en-US" sz="3200" dirty="0"/>
@@ -24903,19 +24858,7 @@
             </a:r>
             <a:r>
               <a:rPr lang="en-US" sz="3200" dirty="0" smtClean="0"/>
-              <a:t>fter receiving </a:t>
-            </a:r>
-            <a:r>
-              <a:rPr lang="en-US" sz="3200" dirty="0" smtClean="0"/>
-              <a:t>their burger from the </a:t>
-            </a:r>
-            <a:r>
-              <a:rPr lang="en-US" sz="3200" dirty="0" smtClean="0"/>
-              <a:t>server, </a:t>
-            </a:r>
-            <a:r>
-              <a:rPr lang="en-US" sz="3200" dirty="0" smtClean="0"/>
-              <a:t>they leave searching breath-first search for a door.</a:t>
+              <a:t>fter receiving their burger from the server, they leave searching breath-first search for a door.</a:t>
             </a:r>
             <a:endParaRPr lang="en-US" sz="3200" dirty="0"/>
           </a:p>
@@ -24988,35 +24931,7 @@
             <a:pPr algn="just"/>
             <a:r>
               <a:rPr lang="en-US" sz="3200" dirty="0" smtClean="0"/>
-              <a:t>The Kitchen receives an order from the robot waiter and starts to cook the food if </a:t>
-            </a:r>
-            <a:r>
-              <a:rPr lang="en-US" sz="3200" dirty="0" smtClean="0"/>
-              <a:t>there is an </a:t>
-            </a:r>
-            <a:r>
-              <a:rPr lang="en-US" sz="3200" dirty="0" smtClean="0"/>
-              <a:t>open </a:t>
-            </a:r>
-            <a:r>
-              <a:rPr lang="en-US" sz="3200" dirty="0" smtClean="0"/>
-              <a:t>counter.  The food takes 10 steps to make. </a:t>
-            </a:r>
-            <a:r>
-              <a:rPr lang="en-US" sz="3200" dirty="0" smtClean="0"/>
-              <a:t>The </a:t>
-            </a:r>
-            <a:r>
-              <a:rPr lang="en-US" sz="3200" dirty="0" smtClean="0"/>
-              <a:t>food </a:t>
-            </a:r>
-            <a:r>
-              <a:rPr lang="en-US" sz="3200" dirty="0" smtClean="0"/>
-              <a:t>goes on </a:t>
-            </a:r>
-            <a:r>
-              <a:rPr lang="en-US" sz="3200" dirty="0" smtClean="0"/>
-              <a:t>the conveyor belt to the robot arm. If after 15 steps of cooking and the conveyor belt is full the food is thrown away and cooked again.</a:t>
+              <a:t>The Kitchen receives an order from the robot waiter and starts to cook the food if there is an open counter.  The food takes 10 steps to make. The food goes on the conveyor belt to the robot arm. If after 15 steps of cooking and the conveyor belt is full the food is thrown away and cooked again.</a:t>
             </a:r>
             <a:endParaRPr lang="en-US" sz="3200" dirty="0"/>
           </a:p>
@@ -25312,19 +25227,7 @@
             </a:pPr>
             <a:r>
               <a:rPr lang="en-US" sz="3200" dirty="0" smtClean="0"/>
-              <a:t>Compare two management styles </a:t>
-            </a:r>
-            <a:r>
-              <a:rPr lang="en-US" sz="3200" dirty="0" smtClean="0"/>
-              <a:t>used by the</a:t>
-            </a:r>
-            <a:r>
-              <a:rPr lang="en-US" sz="3200" dirty="0" smtClean="0"/>
-              <a:t> </a:t>
-            </a:r>
-            <a:r>
-              <a:rPr lang="en-US" sz="3200" dirty="0" smtClean="0"/>
-              <a:t>Command Center</a:t>
+              <a:t>Compare two management styles used by the Command Center</a:t>
             </a:r>
           </a:p>
           <a:p>
@@ -25334,17 +25237,8 @@
             </a:pPr>
             <a:r>
               <a:rPr lang="en-US" sz="3200" dirty="0" smtClean="0"/>
-              <a:t>1:20 </a:t>
+              <a:t>1:20 chance for new customer every step</a:t>
             </a:r>
-            <a:r>
-              <a:rPr lang="en-US" sz="3200" dirty="0" smtClean="0"/>
-              <a:t>chance for new </a:t>
-            </a:r>
-            <a:r>
-              <a:rPr lang="en-US" sz="3200" dirty="0" smtClean="0"/>
-              <a:t>customer every step</a:t>
-            </a:r>
-            <a:endParaRPr lang="en-US" sz="3200" dirty="0" smtClean="0"/>
           </a:p>
           <a:p>
             <a:pPr marL="514350" indent="-514350">
@@ -25371,13 +25265,8 @@
             </a:pPr>
             <a:r>
               <a:rPr lang="en-US" sz="3200" dirty="0" smtClean="0"/>
-              <a:t>30,000 time </a:t>
+              <a:t>30,000 time steps for each management style</a:t>
             </a:r>
-            <a:r>
-              <a:rPr lang="en-US" sz="3200" dirty="0" smtClean="0"/>
-              <a:t>steps for each management style</a:t>
-            </a:r>
-            <a:endParaRPr lang="en-US" sz="3200" dirty="0" smtClean="0"/>
           </a:p>
           <a:p>
             <a:pPr marL="514350" indent="-514350">
@@ -25400,7 +25289,23 @@
             <a:pPr algn="just"/>
             <a:r>
               <a:rPr lang="en-US" sz="3200" dirty="0" smtClean="0"/>
-              <a:t>The results demonstrate that with  the set number of robots for the experiment that evenly split was marginally better for getting customers out faster.</a:t>
+              <a:t>The results demonstrate that with  the set number of robots for the experiment that </a:t>
+            </a:r>
+            <a:r>
+              <a:rPr lang="en-US" sz="3200" dirty="0" smtClean="0"/>
+              <a:t>splitting the room </a:t>
+            </a:r>
+            <a:r>
+              <a:rPr lang="en-US" sz="3200" dirty="0" smtClean="0"/>
+              <a:t>was </a:t>
+            </a:r>
+            <a:r>
+              <a:rPr lang="en-US" sz="3200" dirty="0" smtClean="0"/>
+              <a:t>better </a:t>
+            </a:r>
+            <a:r>
+              <a:rPr lang="en-US" sz="3200" dirty="0" smtClean="0"/>
+              <a:t>for getting customers out faster.</a:t>
             </a:r>
           </a:p>
         </p:txBody>
@@ -25481,30 +25386,6 @@
       </p:pic>
       <p:graphicFrame>
         <p:nvGraphicFramePr>
-          <p:cNvPr id="29" name="Chart 28"/>
-          <p:cNvGraphicFramePr>
-            <a:graphicFrameLocks/>
-          </p:cNvGraphicFramePr>
-          <p:nvPr>
-            <p:extLst>
-              <p:ext uri="{D42A27DB-BD31-4B8C-83A1-F6EECF244321}">
-                <p14:modId xmlns:p14="http://schemas.microsoft.com/office/powerpoint/2010/main" val="1509016499"/>
-              </p:ext>
-            </p:extLst>
-          </p:nvPr>
-        </p:nvGraphicFramePr>
-        <p:xfrm>
-          <a:off x="22783800" y="22133242"/>
-          <a:ext cx="9448800" cy="4876800"/>
-        </p:xfrm>
-        <a:graphic>
-          <a:graphicData uri="http://schemas.openxmlformats.org/drawingml/2006/chart">
-            <c:chart xmlns:c="http://schemas.openxmlformats.org/drawingml/2006/chart" xmlns:r="http://schemas.openxmlformats.org/officeDocument/2006/relationships" r:id="rId10"/>
-          </a:graphicData>
-        </a:graphic>
-      </p:graphicFrame>
-      <p:graphicFrame>
-        <p:nvGraphicFramePr>
           <p:cNvPr id="30" name="Chart 29"/>
           <p:cNvGraphicFramePr>
             <a:graphicFrameLocks/>
@@ -25512,7 +25393,7 @@
           <p:nvPr>
             <p:extLst>
               <p:ext uri="{D42A27DB-BD31-4B8C-83A1-F6EECF244321}">
-                <p14:modId xmlns:p14="http://schemas.microsoft.com/office/powerpoint/2010/main" val="3682158370"/>
+                <p14:modId xmlns:p14="http://schemas.microsoft.com/office/powerpoint/2010/main" xmlns="" val="3682158370"/>
               </p:ext>
             </p:extLst>
           </p:nvPr>
@@ -25523,7 +25404,7 @@
         </p:xfrm>
         <a:graphic>
           <a:graphicData uri="http://schemas.openxmlformats.org/drawingml/2006/chart">
-            <c:chart xmlns:c="http://schemas.openxmlformats.org/drawingml/2006/chart" xmlns:r="http://schemas.openxmlformats.org/officeDocument/2006/relationships" r:id="rId11"/>
+            <c:chart xmlns:c="http://schemas.openxmlformats.org/drawingml/2006/chart" xmlns:r="http://schemas.openxmlformats.org/officeDocument/2006/relationships" r:id="rId10"/>
           </a:graphicData>
         </a:graphic>
       </p:graphicFrame>
@@ -25536,7 +25417,7 @@
           <p:nvPr>
             <p:extLst>
               <p:ext uri="{D42A27DB-BD31-4B8C-83A1-F6EECF244321}">
-                <p14:modId xmlns:p14="http://schemas.microsoft.com/office/powerpoint/2010/main" val="1333578443"/>
+                <p14:modId xmlns:p14="http://schemas.microsoft.com/office/powerpoint/2010/main" xmlns="" val="1333578443"/>
               </p:ext>
             </p:extLst>
           </p:nvPr>
@@ -25544,6 +25425,22 @@
         <p:xfrm>
           <a:off x="11353800" y="22133242"/>
           <a:ext cx="11277600" cy="5074922"/>
+        </p:xfrm>
+        <a:graphic>
+          <a:graphicData uri="http://schemas.openxmlformats.org/drawingml/2006/chart">
+            <c:chart xmlns:c="http://schemas.openxmlformats.org/drawingml/2006/chart" xmlns:r="http://schemas.openxmlformats.org/officeDocument/2006/relationships" r:id="rId11"/>
+          </a:graphicData>
+        </a:graphic>
+      </p:graphicFrame>
+      <p:graphicFrame>
+        <p:nvGraphicFramePr>
+          <p:cNvPr id="23" name="Chart 22"/>
+          <p:cNvGraphicFramePr/>
+          <p:nvPr/>
+        </p:nvGraphicFramePr>
+        <p:xfrm>
+          <a:off x="22783800" y="22174200"/>
+          <a:ext cx="9906000" cy="4876800"/>
         </p:xfrm>
         <a:graphic>
           <a:graphicData uri="http://schemas.openxmlformats.org/drawingml/2006/chart">

</xml_diff>

<commit_message>
Aligning graphs on poster
</commit_message>
<xml_diff>
--- a/GridWorld/Results/PosterPresentation.pptx
+++ b/GridWorld/Results/PosterPresentation.pptx
@@ -26204,7 +26204,7 @@
           <p:nvPr/>
         </p:nvGraphicFramePr>
         <p:xfrm>
-          <a:off x="22479000" y="21793200"/>
+          <a:off x="22555200" y="21983700"/>
           <a:ext cx="9906000" cy="5181600"/>
         </p:xfrm>
         <a:graphic>
@@ -26220,7 +26220,7 @@
           <p:nvPr/>
         </p:nvGraphicFramePr>
         <p:xfrm>
-          <a:off x="304800" y="22021800"/>
+          <a:off x="304800" y="22098000"/>
           <a:ext cx="11201400" cy="5105400"/>
         </p:xfrm>
         <a:graphic>

</xml_diff>

<commit_message>
Fixed a few poster mistakes
</commit_message>
<xml_diff>
--- a/GridWorld/Results/PosterPresentation.pptx
+++ b/GridWorld/Results/PosterPresentation.pptx
@@ -19322,7 +19322,7 @@
         <a:p>
           <a:r>
             <a:rPr lang="en-US" dirty="0" smtClean="0"/>
-            <a:t>Customers leaves</a:t>
+            <a:t>Customer leaves</a:t>
           </a:r>
           <a:endParaRPr lang="en-US" dirty="0"/>
         </a:p>
@@ -20911,7 +20911,7 @@
           </a:pPr>
           <a:r>
             <a:rPr lang="en-US" sz="2600" kern="1200" dirty="0" smtClean="0"/>
-            <a:t>Customers leaves</a:t>
+            <a:t>Customer leaves</a:t>
           </a:r>
           <a:endParaRPr lang="en-US" sz="2600" kern="1200" dirty="0"/>
         </a:p>
@@ -25654,7 +25654,15 @@
             <a:pPr algn="just"/>
             <a:r>
               <a:rPr lang="en-US" sz="3200" dirty="0" smtClean="0"/>
-              <a:t>In our world, customers appear at the door given a random change every world step.  They then randomly depth-first search for an open table. They request a burger after being asked a random number of times by the waiter. </a:t>
+              <a:t>In our world, customers appear at the door given a random </a:t>
+            </a:r>
+            <a:r>
+              <a:rPr lang="en-US" sz="3200" dirty="0" smtClean="0"/>
+              <a:t>chance </a:t>
+            </a:r>
+            <a:r>
+              <a:rPr lang="en-US" sz="3200" dirty="0" smtClean="0"/>
+              <a:t>every world step.  They then randomly depth-first search for an open table. They request a burger after being asked a random number of times by the waiter. </a:t>
             </a:r>
             <a:r>
               <a:rPr lang="en-US" sz="3200" dirty="0"/>
@@ -25662,7 +25670,23 @@
             </a:r>
             <a:r>
               <a:rPr lang="en-US" sz="3200" dirty="0" smtClean="0"/>
-              <a:t>fter receiving their burger from the server, they leave searching </a:t>
+              <a:t>fter receiving their burger from the </a:t>
+            </a:r>
+            <a:r>
+              <a:rPr lang="en-US" sz="3200" dirty="0" smtClean="0"/>
+              <a:t>robo</a:t>
+            </a:r>
+            <a:r>
+              <a:rPr lang="en-US" sz="3200" dirty="0" smtClean="0"/>
+              <a:t>t </a:t>
+            </a:r>
+            <a:r>
+              <a:rPr lang="en-US" sz="3200" dirty="0" smtClean="0"/>
+              <a:t>server</a:t>
+            </a:r>
+            <a:r>
+              <a:rPr lang="en-US" sz="3200" dirty="0" smtClean="0"/>
+              <a:t>, they leave searching </a:t>
             </a:r>
             <a:r>
               <a:rPr lang="en-US" sz="3200" dirty="0" smtClean="0"/>
@@ -25845,7 +25869,15 @@
             </a:pPr>
             <a:r>
               <a:rPr lang="en-US" sz="3200" dirty="0" smtClean="0"/>
-              <a:t>Each new customer goes to the next robot and cycles back to the first robot.</a:t>
+              <a:t>Each new customer goes to the next robot and </a:t>
+            </a:r>
+            <a:r>
+              <a:rPr lang="en-US" sz="3200" dirty="0" smtClean="0"/>
+              <a:t>eventually cycles </a:t>
+            </a:r>
+            <a:r>
+              <a:rPr lang="en-US" sz="3200" dirty="0" smtClean="0"/>
+              <a:t>back to the first robot.</a:t>
             </a:r>
           </a:p>
           <a:p>

</xml_diff>

<commit_message>
PDF Poster add and poster updated
</commit_message>
<xml_diff>
--- a/GridWorld/Results/PosterPresentation.pptx
+++ b/GridWorld/Results/PosterPresentation.pptx
@@ -109,8 +109,17 @@
 
 <file path=ppt/charts/chart1.xml><?xml version="1.0" encoding="utf-8"?>
 <c:chartSpace xmlns:c="http://schemas.openxmlformats.org/drawingml/2006/chart" xmlns:a="http://schemas.openxmlformats.org/drawingml/2006/main" xmlns:r="http://schemas.openxmlformats.org/officeDocument/2006/relationships">
+  <c:date1904 val="0"/>
   <c:lang val="en-US"/>
-  <c:style val="5"/>
+  <c:roundedCorners val="0"/>
+  <mc:AlternateContent xmlns:mc="http://schemas.openxmlformats.org/markup-compatibility/2006">
+    <mc:Choice xmlns:c14="http://schemas.microsoft.com/office/drawing/2007/8/2/chart" Requires="c14">
+      <c14:style val="105"/>
+    </mc:Choice>
+    <mc:Fallback>
+      <c:style val="5"/>
+    </mc:Fallback>
+  </mc:AlternateContent>
   <c:chart>
     <c:title>
       <c:tx>
@@ -129,11 +138,14 @@
         </c:rich>
       </c:tx>
       <c:layout/>
+      <c:overlay val="0"/>
     </c:title>
+    <c:autoTitleDeleted val="0"/>
     <c:plotArea>
       <c:layout/>
       <c:scatterChart>
         <c:scatterStyle val="lineMarker"/>
+        <c:varyColors val="0"/>
         <c:ser>
           <c:idx val="0"/>
           <c:order val="0"/>
@@ -8515,17 +8527,27 @@
               </c:numCache>
             </c:numRef>
           </c:yVal>
+          <c:smooth val="0"/>
         </c:ser>
-        <c:axId val="115117440"/>
-        <c:axId val="114902528"/>
+        <c:dLbls>
+          <c:showLegendKey val="0"/>
+          <c:showVal val="0"/>
+          <c:showCatName val="0"/>
+          <c:showSerName val="0"/>
+          <c:showPercent val="0"/>
+          <c:showBubbleSize val="0"/>
+        </c:dLbls>
+        <c:axId val="88786432"/>
+        <c:axId val="88788352"/>
       </c:scatterChart>
       <c:valAx>
-        <c:axId val="115117440"/>
+        <c:axId val="88786432"/>
         <c:scaling>
           <c:orientation val="minMax"/>
           <c:max val="31000"/>
           <c:min val="0"/>
         </c:scaling>
+        <c:delete val="0"/>
         <c:axPos val="b"/>
         <c:title>
           <c:tx>
@@ -8544,18 +8566,22 @@
             </c:rich>
           </c:tx>
           <c:layout/>
+          <c:overlay val="0"/>
         </c:title>
         <c:numFmt formatCode="General" sourceLinked="1"/>
+        <c:majorTickMark val="out"/>
+        <c:minorTickMark val="none"/>
         <c:tickLblPos val="nextTo"/>
-        <c:crossAx val="114902528"/>
+        <c:crossAx val="88788352"/>
         <c:crosses val="autoZero"/>
         <c:crossBetween val="midCat"/>
       </c:valAx>
       <c:valAx>
-        <c:axId val="114902528"/>
+        <c:axId val="88788352"/>
         <c:scaling>
           <c:orientation val="minMax"/>
         </c:scaling>
+        <c:delete val="0"/>
         <c:axPos val="l"/>
         <c:majorGridlines/>
         <c:title>
@@ -8575,10 +8601,13 @@
             </c:rich>
           </c:tx>
           <c:layout/>
+          <c:overlay val="0"/>
         </c:title>
         <c:numFmt formatCode="General" sourceLinked="1"/>
+        <c:majorTickMark val="out"/>
+        <c:minorTickMark val="none"/>
         <c:tickLblPos val="nextTo"/>
-        <c:crossAx val="115117440"/>
+        <c:crossAx val="88786432"/>
         <c:crosses val="autoZero"/>
         <c:crossBetween val="midCat"/>
       </c:valAx>
@@ -8586,9 +8615,11 @@
     <c:legend>
       <c:legendPos val="r"/>
       <c:layout/>
+      <c:overlay val="0"/>
     </c:legend>
     <c:plotVisOnly val="1"/>
     <c:dispBlanksAs val="gap"/>
+    <c:showDLblsOverMax val="0"/>
   </c:chart>
   <c:txPr>
     <a:bodyPr/>
@@ -8600,14 +8631,25 @@
       <a:endParaRPr lang="en-US"/>
     </a:p>
   </c:txPr>
-  <c:externalData r:id="rId1"/>
+  <c:externalData r:id="rId1">
+    <c:autoUpdate val="0"/>
+  </c:externalData>
 </c:chartSpace>
 </file>
 
 <file path=ppt/charts/chart2.xml><?xml version="1.0" encoding="utf-8"?>
 <c:chartSpace xmlns:c="http://schemas.openxmlformats.org/drawingml/2006/chart" xmlns:a="http://schemas.openxmlformats.org/drawingml/2006/main" xmlns:r="http://schemas.openxmlformats.org/officeDocument/2006/relationships">
+  <c:date1904 val="0"/>
   <c:lang val="en-US"/>
-  <c:style val="7"/>
+  <c:roundedCorners val="0"/>
+  <mc:AlternateContent xmlns:mc="http://schemas.openxmlformats.org/markup-compatibility/2006">
+    <mc:Choice xmlns:c14="http://schemas.microsoft.com/office/drawing/2007/8/2/chart" Requires="c14">
+      <c14:style val="107"/>
+    </mc:Choice>
+    <mc:Fallback>
+      <c:style val="7"/>
+    </mc:Fallback>
+  </mc:AlternateContent>
   <c:chart>
     <c:title>
       <c:tx>
@@ -8626,11 +8668,14 @@
         </c:rich>
       </c:tx>
       <c:layout/>
+      <c:overlay val="0"/>
     </c:title>
+    <c:autoTitleDeleted val="0"/>
     <c:plotArea>
       <c:layout/>
       <c:scatterChart>
         <c:scatterStyle val="lineMarker"/>
+        <c:varyColors val="0"/>
         <c:ser>
           <c:idx val="0"/>
           <c:order val="0"/>
@@ -17924,17 +17969,27 @@
               </c:numCache>
             </c:numRef>
           </c:yVal>
+          <c:smooth val="0"/>
         </c:ser>
-        <c:axId val="103289984"/>
-        <c:axId val="103291904"/>
+        <c:dLbls>
+          <c:showLegendKey val="0"/>
+          <c:showVal val="0"/>
+          <c:showCatName val="0"/>
+          <c:showSerName val="0"/>
+          <c:showPercent val="0"/>
+          <c:showBubbleSize val="0"/>
+        </c:dLbls>
+        <c:axId val="92837376"/>
+        <c:axId val="93581312"/>
       </c:scatterChart>
       <c:valAx>
-        <c:axId val="103289984"/>
+        <c:axId val="92837376"/>
         <c:scaling>
           <c:orientation val="minMax"/>
           <c:max val="31000"/>
           <c:min val="0"/>
         </c:scaling>
+        <c:delete val="0"/>
         <c:axPos val="b"/>
         <c:title>
           <c:tx>
@@ -17953,20 +18008,24 @@
             </c:rich>
           </c:tx>
           <c:layout/>
+          <c:overlay val="0"/>
         </c:title>
         <c:numFmt formatCode="General" sourceLinked="1"/>
+        <c:majorTickMark val="out"/>
+        <c:minorTickMark val="none"/>
         <c:tickLblPos val="nextTo"/>
-        <c:crossAx val="103291904"/>
+        <c:crossAx val="93581312"/>
         <c:crosses val="autoZero"/>
         <c:crossBetween val="midCat"/>
       </c:valAx>
       <c:valAx>
-        <c:axId val="103291904"/>
+        <c:axId val="93581312"/>
         <c:scaling>
           <c:orientation val="minMax"/>
           <c:max val="350"/>
           <c:min val="0"/>
         </c:scaling>
+        <c:delete val="0"/>
         <c:axPos val="l"/>
         <c:majorGridlines/>
         <c:title>
@@ -17986,10 +18045,13 @@
             </c:rich>
           </c:tx>
           <c:layout/>
+          <c:overlay val="0"/>
         </c:title>
         <c:numFmt formatCode="General" sourceLinked="1"/>
+        <c:majorTickMark val="out"/>
+        <c:minorTickMark val="none"/>
         <c:tickLblPos val="nextTo"/>
-        <c:crossAx val="103289984"/>
+        <c:crossAx val="92837376"/>
         <c:crosses val="autoZero"/>
         <c:crossBetween val="midCat"/>
       </c:valAx>
@@ -17997,8 +18059,11 @@
     <c:legend>
       <c:legendPos val="r"/>
       <c:layout/>
+      <c:overlay val="0"/>
     </c:legend>
     <c:plotVisOnly val="1"/>
+    <c:dispBlanksAs val="gap"/>
+    <c:showDLblsOverMax val="0"/>
   </c:chart>
   <c:txPr>
     <a:bodyPr/>
@@ -18010,13 +18075,25 @@
       <a:endParaRPr lang="en-US"/>
     </a:p>
   </c:txPr>
-  <c:externalData r:id="rId1"/>
+  <c:externalData r:id="rId1">
+    <c:autoUpdate val="0"/>
+  </c:externalData>
 </c:chartSpace>
 </file>
 
 <file path=ppt/charts/chart3.xml><?xml version="1.0" encoding="utf-8"?>
 <c:chartSpace xmlns:c="http://schemas.openxmlformats.org/drawingml/2006/chart" xmlns:a="http://schemas.openxmlformats.org/drawingml/2006/main" xmlns:r="http://schemas.openxmlformats.org/officeDocument/2006/relationships">
+  <c:date1904 val="0"/>
   <c:lang val="en-US"/>
+  <c:roundedCorners val="0"/>
+  <mc:AlternateContent xmlns:mc="http://schemas.openxmlformats.org/markup-compatibility/2006">
+    <mc:Choice xmlns:c14="http://schemas.microsoft.com/office/drawing/2007/8/2/chart" Requires="c14">
+      <c14:style val="102"/>
+    </mc:Choice>
+    <mc:Fallback>
+      <c:style val="2"/>
+    </mc:Fallback>
+  </mc:AlternateContent>
   <c:chart>
     <c:title>
       <c:tx>
@@ -18035,12 +18112,15 @@
         </c:rich>
       </c:tx>
       <c:layout/>
+      <c:overlay val="0"/>
     </c:title>
+    <c:autoTitleDeleted val="0"/>
     <c:plotArea>
       <c:layout/>
       <c:barChart>
         <c:barDir val="bar"/>
         <c:grouping val="clustered"/>
+        <c:varyColors val="0"/>
         <c:ser>
           <c:idx val="2"/>
           <c:order val="0"/>
@@ -18088,6 +18168,7 @@
               </a:outerShdw>
             </a:effectLst>
           </c:spPr>
+          <c:invertIfNegative val="0"/>
           <c:cat>
             <c:strRef>
               <c:f>Histograms!$A$14:$A$21</c:f>
@@ -18201,6 +18282,7 @@
               </a:outerShdw>
             </a:effectLst>
           </c:spPr>
+          <c:invertIfNegative val="0"/>
           <c:val>
             <c:numRef>
               <c:f>Histograms!$T$3:$T$10</c:f>
@@ -18282,6 +18364,7 @@
               </a:outerShdw>
             </a:effectLst>
           </c:spPr>
+          <c:invertIfNegative val="0"/>
           <c:val>
             <c:numRef>
               <c:f>Histograms!$Z$3:$Z$10</c:f>
@@ -18316,14 +18399,24 @@
             </c:numRef>
           </c:val>
         </c:ser>
-        <c:axId val="106862848"/>
-        <c:axId val="115741056"/>
+        <c:dLbls>
+          <c:showLegendKey val="0"/>
+          <c:showVal val="0"/>
+          <c:showCatName val="0"/>
+          <c:showSerName val="0"/>
+          <c:showPercent val="0"/>
+          <c:showBubbleSize val="0"/>
+        </c:dLbls>
+        <c:gapWidth val="150"/>
+        <c:axId val="103529472"/>
+        <c:axId val="103564416"/>
       </c:barChart>
       <c:catAx>
-        <c:axId val="106862848"/>
+        <c:axId val="103529472"/>
         <c:scaling>
           <c:orientation val="minMax"/>
         </c:scaling>
+        <c:delete val="0"/>
         <c:axPos val="l"/>
         <c:title>
           <c:tx>
@@ -18342,20 +18435,25 @@
             </c:rich>
           </c:tx>
           <c:layout/>
+          <c:overlay val="0"/>
         </c:title>
         <c:numFmt formatCode="General" sourceLinked="1"/>
+        <c:majorTickMark val="out"/>
+        <c:minorTickMark val="none"/>
         <c:tickLblPos val="nextTo"/>
-        <c:crossAx val="115741056"/>
+        <c:crossAx val="103564416"/>
         <c:crosses val="autoZero"/>
         <c:auto val="1"/>
         <c:lblAlgn val="ctr"/>
         <c:lblOffset val="100"/>
+        <c:noMultiLvlLbl val="0"/>
       </c:catAx>
       <c:valAx>
-        <c:axId val="115741056"/>
+        <c:axId val="103564416"/>
         <c:scaling>
           <c:orientation val="minMax"/>
         </c:scaling>
+        <c:delete val="0"/>
         <c:axPos val="b"/>
         <c:majorGridlines/>
         <c:title>
@@ -18375,10 +18473,13 @@
             </c:rich>
           </c:tx>
           <c:layout/>
+          <c:overlay val="0"/>
         </c:title>
         <c:numFmt formatCode="General" sourceLinked="1"/>
+        <c:majorTickMark val="out"/>
+        <c:minorTickMark val="none"/>
         <c:tickLblPos val="nextTo"/>
-        <c:crossAx val="106862848"/>
+        <c:crossAx val="103529472"/>
         <c:crosses val="autoZero"/>
         <c:crossBetween val="between"/>
       </c:valAx>
@@ -18386,6 +18487,7 @@
     <c:legend>
       <c:legendPos val="r"/>
       <c:layout/>
+      <c:overlay val="0"/>
       <c:txPr>
         <a:bodyPr/>
         <a:lstStyle/>
@@ -18399,8 +18501,11 @@
     </c:legend>
     <c:plotVisOnly val="1"/>
     <c:dispBlanksAs val="gap"/>
+    <c:showDLblsOverMax val="0"/>
   </c:chart>
-  <c:externalData r:id="rId1"/>
+  <c:externalData r:id="rId1">
+    <c:autoUpdate val="0"/>
+  </c:externalData>
 </c:chartSpace>
 </file>
 
@@ -19426,7 +19531,12 @@
     </dgm:pt>
     <dgm:pt modelId="{28B43E1A-3839-4C4D-8F80-935F2F9719D0}">
       <dgm:prSet/>
-      <dgm:spPr/>
+      <dgm:spPr>
+        <a:scene3d>
+          <a:camera prst="orthographicFront"/>
+          <a:lightRig rig="flat" dir="t"/>
+        </a:scene3d>
+      </dgm:spPr>
       <dgm:t>
         <a:bodyPr/>
         <a:lstStyle/>
@@ -19719,31 +19829,31 @@
     </dgm:pt>
   </dgm:ptLst>
   <dgm:cxnLst>
+    <dgm:cxn modelId="{41E1E77E-F043-4DBD-AFBE-EB48784C3D3D}" srcId="{9C6D5CE4-86D8-4664-9A20-DC92DA18EE08}" destId="{2EBE1526-034E-4846-BA5B-7E67FD940F40}" srcOrd="0" destOrd="0" parTransId="{558FE27A-589D-45FA-AA6E-816B18699CEB}" sibTransId="{EFCA5423-9B82-419C-9560-4478FC8BAA06}"/>
+    <dgm:cxn modelId="{9852A694-E846-48C9-9969-F14E18393BD0}" srcId="{9C6D5CE4-86D8-4664-9A20-DC92DA18EE08}" destId="{6A946480-B202-4C83-907D-1E7D463DB7FE}" srcOrd="4" destOrd="0" parTransId="{916AA518-F6E0-4CF4-AD04-E020B40F24A4}" sibTransId="{842EDCCB-4B10-4649-AFEE-FBA98B9B21BC}"/>
+    <dgm:cxn modelId="{61A29AE2-48D8-428E-85E2-BED76048C137}" type="presOf" srcId="{DFDACCFF-42CC-4B9B-8D93-6006CBD8456B}" destId="{78D7A4A0-C52A-4593-ADC7-373B3AA24A05}" srcOrd="0" destOrd="0" presId="urn:microsoft.com/office/officeart/2005/8/layout/cycle5"/>
+    <dgm:cxn modelId="{BE3096D7-EDD6-4C0F-9964-624DC8672762}" type="presOf" srcId="{7C389107-6123-41DD-ABD8-3853D285C045}" destId="{CDF45B74-43D1-4864-8587-D1FAAB443F2E}" srcOrd="0" destOrd="0" presId="urn:microsoft.com/office/officeart/2005/8/layout/cycle5"/>
     <dgm:cxn modelId="{B9876142-B23B-4347-A968-842F8114BD52}" srcId="{9C6D5CE4-86D8-4664-9A20-DC92DA18EE08}" destId="{4DE6D936-E174-4051-B1D8-1BDDF24DB5F8}" srcOrd="6" destOrd="0" parTransId="{C9F1BA76-0055-4B26-A0A4-7EA152022C36}" sibTransId="{E70761AC-F5FD-4E3F-B9B3-570C3DB3E6F1}"/>
+    <dgm:cxn modelId="{77D95732-6FCD-4B5B-A73D-AED6F4D3652A}" type="presOf" srcId="{EA98387A-89AA-43AF-8DB5-16E3A11849D7}" destId="{297F8660-F777-4497-8254-50A29AA0497B}" srcOrd="0" destOrd="0" presId="urn:microsoft.com/office/officeart/2005/8/layout/cycle5"/>
+    <dgm:cxn modelId="{78BE3338-D950-4E82-8551-2A76F2C486D1}" type="presOf" srcId="{4DE6D936-E174-4051-B1D8-1BDDF24DB5F8}" destId="{6B80934C-B27F-4DB7-ADE5-C1F560483D98}" srcOrd="0" destOrd="0" presId="urn:microsoft.com/office/officeart/2005/8/layout/cycle5"/>
+    <dgm:cxn modelId="{EC1A368D-29B5-40E1-914E-DDF9A66808FC}" type="presOf" srcId="{EFCA5423-9B82-419C-9560-4478FC8BAA06}" destId="{D9A75A5C-A763-48CB-9D34-226AE0D7AFDA}" srcOrd="0" destOrd="0" presId="urn:microsoft.com/office/officeart/2005/8/layout/cycle5"/>
+    <dgm:cxn modelId="{FA0A59D8-DD9A-4CCD-8C7B-28CC0C5576C0}" type="presOf" srcId="{69DF6F6F-4636-4FAB-B22A-52FB336A356B}" destId="{5F10BEA9-A78E-43DB-B73B-503C391A832F}" srcOrd="0" destOrd="0" presId="urn:microsoft.com/office/officeart/2005/8/layout/cycle5"/>
+    <dgm:cxn modelId="{08A35419-645A-491D-B5F4-22E1A015C7DF}" type="presOf" srcId="{28B43E1A-3839-4C4D-8F80-935F2F9719D0}" destId="{BD598EA8-E28E-4209-94DF-EB5A37FA7F79}" srcOrd="0" destOrd="0" presId="urn:microsoft.com/office/officeart/2005/8/layout/cycle5"/>
+    <dgm:cxn modelId="{1F896BBD-78A0-44F1-AF75-3B496C8B267F}" type="presOf" srcId="{3E2957FF-C442-4087-8D6B-F5C91D7FDAD9}" destId="{DB534CCA-AE08-4581-ACCD-A09DBD19921E}" srcOrd="0" destOrd="0" presId="urn:microsoft.com/office/officeart/2005/8/layout/cycle5"/>
+    <dgm:cxn modelId="{4ED7FA45-F1A1-41B8-B1CA-07F2BC6A2149}" type="presOf" srcId="{9C6D5CE4-86D8-4664-9A20-DC92DA18EE08}" destId="{4E743305-1674-4BDB-9931-68209537AA53}" srcOrd="0" destOrd="0" presId="urn:microsoft.com/office/officeart/2005/8/layout/cycle5"/>
+    <dgm:cxn modelId="{1449721F-321E-4D2E-913D-8F348FF33FA7}" srcId="{9C6D5CE4-86D8-4664-9A20-DC92DA18EE08}" destId="{28B43E1A-3839-4C4D-8F80-935F2F9719D0}" srcOrd="7" destOrd="0" parTransId="{D75DE74E-DE2F-4A09-8BAA-DFFBB782FE12}" sibTransId="{3E2957FF-C442-4087-8D6B-F5C91D7FDAD9}"/>
+    <dgm:cxn modelId="{E9F461CC-30C9-488E-A233-E5461DA84F52}" type="presOf" srcId="{1577B942-6ECA-4880-9B51-4038D7D84263}" destId="{3386A11E-F2B4-4DCD-B506-A33E427E71A9}" srcOrd="0" destOrd="0" presId="urn:microsoft.com/office/officeart/2005/8/layout/cycle5"/>
+    <dgm:cxn modelId="{1F38BCFE-0D44-4AF3-A144-FB4842AF5D9A}" type="presOf" srcId="{2EBE1526-034E-4846-BA5B-7E67FD940F40}" destId="{2E3E1793-7BCD-4E05-8DEB-C949BC343643}" srcOrd="0" destOrd="0" presId="urn:microsoft.com/office/officeart/2005/8/layout/cycle5"/>
+    <dgm:cxn modelId="{264287FB-723D-42A6-AEBD-F6231388F8B8}" srcId="{9C6D5CE4-86D8-4664-9A20-DC92DA18EE08}" destId="{4AA12DA5-20BB-44FB-966A-ED64A8FDC723}" srcOrd="1" destOrd="0" parTransId="{1BA64373-1244-4343-AF96-187B5FB4BCF4}" sibTransId="{7C389107-6123-41DD-ABD8-3853D285C045}"/>
+    <dgm:cxn modelId="{F4894CFA-D545-4B6A-98C6-C94BF44587CA}" srcId="{9C6D5CE4-86D8-4664-9A20-DC92DA18EE08}" destId="{EA98387A-89AA-43AF-8DB5-16E3A11849D7}" srcOrd="5" destOrd="0" parTransId="{81E2769A-C23B-476B-9E64-192BD49BBEB7}" sibTransId="{69DF6F6F-4636-4FAB-B22A-52FB336A356B}"/>
+    <dgm:cxn modelId="{CB6D9968-05A6-4AC1-83CB-94D4DDF2D426}" type="presOf" srcId="{4AA12DA5-20BB-44FB-966A-ED64A8FDC723}" destId="{3E08DC01-4D3A-4D19-B9F8-0C1143F8B68A}" srcOrd="0" destOrd="0" presId="urn:microsoft.com/office/officeart/2005/8/layout/cycle5"/>
+    <dgm:cxn modelId="{72B7C9E2-959C-4B38-BEBF-0C11BC82F9E5}" type="presOf" srcId="{5168574B-868E-44A6-B6E1-0126FBA50935}" destId="{6222376B-A611-4BFF-A62F-963433A3CF5A}" srcOrd="0" destOrd="0" presId="urn:microsoft.com/office/officeart/2005/8/layout/cycle5"/>
+    <dgm:cxn modelId="{1430A7A4-244D-4FB9-87B9-FBA75682A60E}" type="presOf" srcId="{E70761AC-F5FD-4E3F-B9B3-570C3DB3E6F1}" destId="{1BF5A066-6D81-43E7-9526-E4A444BFC176}" srcOrd="0" destOrd="0" presId="urn:microsoft.com/office/officeart/2005/8/layout/cycle5"/>
+    <dgm:cxn modelId="{AFE96741-B3BD-46A7-937A-FF77E0D85716}" type="presOf" srcId="{FD442C12-20BF-4F71-9045-341C950E77ED}" destId="{242F59CC-6117-43D5-8FE7-7065192DA727}" srcOrd="0" destOrd="0" presId="urn:microsoft.com/office/officeart/2005/8/layout/cycle5"/>
+    <dgm:cxn modelId="{FD45E8E3-F0E3-454F-AF89-0EAA72541B3A}" type="presOf" srcId="{842EDCCB-4B10-4649-AFEE-FBA98B9B21BC}" destId="{5C7EE4B1-4898-4B7C-9DE1-A0EC78F54EDE}" srcOrd="0" destOrd="0" presId="urn:microsoft.com/office/officeart/2005/8/layout/cycle5"/>
+    <dgm:cxn modelId="{A9383A7A-D771-4306-99FC-7D7FA81E5B9F}" srcId="{9C6D5CE4-86D8-4664-9A20-DC92DA18EE08}" destId="{1577B942-6ECA-4880-9B51-4038D7D84263}" srcOrd="3" destOrd="0" parTransId="{C0D02308-FD23-433B-9EBC-109862AF9F79}" sibTransId="{5168574B-868E-44A6-B6E1-0126FBA50935}"/>
+    <dgm:cxn modelId="{7FE3ADC0-C8CD-4C32-BAAB-863278ECE473}" type="presOf" srcId="{6A946480-B202-4C83-907D-1E7D463DB7FE}" destId="{89857E5E-069A-437F-A4AD-A43E3AAD499C}" srcOrd="0" destOrd="0" presId="urn:microsoft.com/office/officeart/2005/8/layout/cycle5"/>
     <dgm:cxn modelId="{57491815-AFA0-4A87-9628-EFCBCEEDFEDF}" srcId="{9C6D5CE4-86D8-4664-9A20-DC92DA18EE08}" destId="{DFDACCFF-42CC-4B9B-8D93-6006CBD8456B}" srcOrd="2" destOrd="0" parTransId="{4E7C24F4-A9F5-4B43-92B7-FB0F7B0F8248}" sibTransId="{FD442C12-20BF-4F71-9045-341C950E77ED}"/>
-    <dgm:cxn modelId="{264287FB-723D-42A6-AEBD-F6231388F8B8}" srcId="{9C6D5CE4-86D8-4664-9A20-DC92DA18EE08}" destId="{4AA12DA5-20BB-44FB-966A-ED64A8FDC723}" srcOrd="1" destOrd="0" parTransId="{1BA64373-1244-4343-AF96-187B5FB4BCF4}" sibTransId="{7C389107-6123-41DD-ABD8-3853D285C045}"/>
-    <dgm:cxn modelId="{CB6D9968-05A6-4AC1-83CB-94D4DDF2D426}" type="presOf" srcId="{4AA12DA5-20BB-44FB-966A-ED64A8FDC723}" destId="{3E08DC01-4D3A-4D19-B9F8-0C1143F8B68A}" srcOrd="0" destOrd="0" presId="urn:microsoft.com/office/officeart/2005/8/layout/cycle5"/>
-    <dgm:cxn modelId="{1F38BCFE-0D44-4AF3-A144-FB4842AF5D9A}" type="presOf" srcId="{2EBE1526-034E-4846-BA5B-7E67FD940F40}" destId="{2E3E1793-7BCD-4E05-8DEB-C949BC343643}" srcOrd="0" destOrd="0" presId="urn:microsoft.com/office/officeart/2005/8/layout/cycle5"/>
-    <dgm:cxn modelId="{77D95732-6FCD-4B5B-A73D-AED6F4D3652A}" type="presOf" srcId="{EA98387A-89AA-43AF-8DB5-16E3A11849D7}" destId="{297F8660-F777-4497-8254-50A29AA0497B}" srcOrd="0" destOrd="0" presId="urn:microsoft.com/office/officeart/2005/8/layout/cycle5"/>
-    <dgm:cxn modelId="{7FE3ADC0-C8CD-4C32-BAAB-863278ECE473}" type="presOf" srcId="{6A946480-B202-4C83-907D-1E7D463DB7FE}" destId="{89857E5E-069A-437F-A4AD-A43E3AAD499C}" srcOrd="0" destOrd="0" presId="urn:microsoft.com/office/officeart/2005/8/layout/cycle5"/>
-    <dgm:cxn modelId="{72B7C9E2-959C-4B38-BEBF-0C11BC82F9E5}" type="presOf" srcId="{5168574B-868E-44A6-B6E1-0126FBA50935}" destId="{6222376B-A611-4BFF-A62F-963433A3CF5A}" srcOrd="0" destOrd="0" presId="urn:microsoft.com/office/officeart/2005/8/layout/cycle5"/>
-    <dgm:cxn modelId="{FD45E8E3-F0E3-454F-AF89-0EAA72541B3A}" type="presOf" srcId="{842EDCCB-4B10-4649-AFEE-FBA98B9B21BC}" destId="{5C7EE4B1-4898-4B7C-9DE1-A0EC78F54EDE}" srcOrd="0" destOrd="0" presId="urn:microsoft.com/office/officeart/2005/8/layout/cycle5"/>
-    <dgm:cxn modelId="{41E1E77E-F043-4DBD-AFBE-EB48784C3D3D}" srcId="{9C6D5CE4-86D8-4664-9A20-DC92DA18EE08}" destId="{2EBE1526-034E-4846-BA5B-7E67FD940F40}" srcOrd="0" destOrd="0" parTransId="{558FE27A-589D-45FA-AA6E-816B18699CEB}" sibTransId="{EFCA5423-9B82-419C-9560-4478FC8BAA06}"/>
-    <dgm:cxn modelId="{AFE96741-B3BD-46A7-937A-FF77E0D85716}" type="presOf" srcId="{FD442C12-20BF-4F71-9045-341C950E77ED}" destId="{242F59CC-6117-43D5-8FE7-7065192DA727}" srcOrd="0" destOrd="0" presId="urn:microsoft.com/office/officeart/2005/8/layout/cycle5"/>
-    <dgm:cxn modelId="{F4894CFA-D545-4B6A-98C6-C94BF44587CA}" srcId="{9C6D5CE4-86D8-4664-9A20-DC92DA18EE08}" destId="{EA98387A-89AA-43AF-8DB5-16E3A11849D7}" srcOrd="5" destOrd="0" parTransId="{81E2769A-C23B-476B-9E64-192BD49BBEB7}" sibTransId="{69DF6F6F-4636-4FAB-B22A-52FB336A356B}"/>
-    <dgm:cxn modelId="{78BE3338-D950-4E82-8551-2A76F2C486D1}" type="presOf" srcId="{4DE6D936-E174-4051-B1D8-1BDDF24DB5F8}" destId="{6B80934C-B27F-4DB7-ADE5-C1F560483D98}" srcOrd="0" destOrd="0" presId="urn:microsoft.com/office/officeart/2005/8/layout/cycle5"/>
-    <dgm:cxn modelId="{BE3096D7-EDD6-4C0F-9964-624DC8672762}" type="presOf" srcId="{7C389107-6123-41DD-ABD8-3853D285C045}" destId="{CDF45B74-43D1-4864-8587-D1FAAB443F2E}" srcOrd="0" destOrd="0" presId="urn:microsoft.com/office/officeart/2005/8/layout/cycle5"/>
-    <dgm:cxn modelId="{A9383A7A-D771-4306-99FC-7D7FA81E5B9F}" srcId="{9C6D5CE4-86D8-4664-9A20-DC92DA18EE08}" destId="{1577B942-6ECA-4880-9B51-4038D7D84263}" srcOrd="3" destOrd="0" parTransId="{C0D02308-FD23-433B-9EBC-109862AF9F79}" sibTransId="{5168574B-868E-44A6-B6E1-0126FBA50935}"/>
-    <dgm:cxn modelId="{1430A7A4-244D-4FB9-87B9-FBA75682A60E}" type="presOf" srcId="{E70761AC-F5FD-4E3F-B9B3-570C3DB3E6F1}" destId="{1BF5A066-6D81-43E7-9526-E4A444BFC176}" srcOrd="0" destOrd="0" presId="urn:microsoft.com/office/officeart/2005/8/layout/cycle5"/>
-    <dgm:cxn modelId="{1F896BBD-78A0-44F1-AF75-3B496C8B267F}" type="presOf" srcId="{3E2957FF-C442-4087-8D6B-F5C91D7FDAD9}" destId="{DB534CCA-AE08-4581-ACCD-A09DBD19921E}" srcOrd="0" destOrd="0" presId="urn:microsoft.com/office/officeart/2005/8/layout/cycle5"/>
-    <dgm:cxn modelId="{08A35419-645A-491D-B5F4-22E1A015C7DF}" type="presOf" srcId="{28B43E1A-3839-4C4D-8F80-935F2F9719D0}" destId="{BD598EA8-E28E-4209-94DF-EB5A37FA7F79}" srcOrd="0" destOrd="0" presId="urn:microsoft.com/office/officeart/2005/8/layout/cycle5"/>
-    <dgm:cxn modelId="{E9F461CC-30C9-488E-A233-E5461DA84F52}" type="presOf" srcId="{1577B942-6ECA-4880-9B51-4038D7D84263}" destId="{3386A11E-F2B4-4DCD-B506-A33E427E71A9}" srcOrd="0" destOrd="0" presId="urn:microsoft.com/office/officeart/2005/8/layout/cycle5"/>
-    <dgm:cxn modelId="{4ED7FA45-F1A1-41B8-B1CA-07F2BC6A2149}" type="presOf" srcId="{9C6D5CE4-86D8-4664-9A20-DC92DA18EE08}" destId="{4E743305-1674-4BDB-9931-68209537AA53}" srcOrd="0" destOrd="0" presId="urn:microsoft.com/office/officeart/2005/8/layout/cycle5"/>
-    <dgm:cxn modelId="{61A29AE2-48D8-428E-85E2-BED76048C137}" type="presOf" srcId="{DFDACCFF-42CC-4B9B-8D93-6006CBD8456B}" destId="{78D7A4A0-C52A-4593-ADC7-373B3AA24A05}" srcOrd="0" destOrd="0" presId="urn:microsoft.com/office/officeart/2005/8/layout/cycle5"/>
-    <dgm:cxn modelId="{9852A694-E846-48C9-9969-F14E18393BD0}" srcId="{9C6D5CE4-86D8-4664-9A20-DC92DA18EE08}" destId="{6A946480-B202-4C83-907D-1E7D463DB7FE}" srcOrd="4" destOrd="0" parTransId="{916AA518-F6E0-4CF4-AD04-E020B40F24A4}" sibTransId="{842EDCCB-4B10-4649-AFEE-FBA98B9B21BC}"/>
-    <dgm:cxn modelId="{FA0A59D8-DD9A-4CCD-8C7B-28CC0C5576C0}" type="presOf" srcId="{69DF6F6F-4636-4FAB-B22A-52FB336A356B}" destId="{5F10BEA9-A78E-43DB-B73B-503C391A832F}" srcOrd="0" destOrd="0" presId="urn:microsoft.com/office/officeart/2005/8/layout/cycle5"/>
-    <dgm:cxn modelId="{1449721F-321E-4D2E-913D-8F348FF33FA7}" srcId="{9C6D5CE4-86D8-4664-9A20-DC92DA18EE08}" destId="{28B43E1A-3839-4C4D-8F80-935F2F9719D0}" srcOrd="7" destOrd="0" parTransId="{D75DE74E-DE2F-4A09-8BAA-DFFBB782FE12}" sibTransId="{3E2957FF-C442-4087-8D6B-F5C91D7FDAD9}"/>
-    <dgm:cxn modelId="{EC1A368D-29B5-40E1-914E-DDF9A66808FC}" type="presOf" srcId="{EFCA5423-9B82-419C-9560-4478FC8BAA06}" destId="{D9A75A5C-A763-48CB-9D34-226AE0D7AFDA}" srcOrd="0" destOrd="0" presId="urn:microsoft.com/office/officeart/2005/8/layout/cycle5"/>
     <dgm:cxn modelId="{108A734A-FC57-42C1-921A-50AFCAC081B3}" type="presParOf" srcId="{4E743305-1674-4BDB-9931-68209537AA53}" destId="{2E3E1793-7BCD-4E05-8DEB-C949BC343643}" srcOrd="0" destOrd="0" presId="urn:microsoft.com/office/officeart/2005/8/layout/cycle5"/>
     <dgm:cxn modelId="{B25FC01B-6856-452D-9413-E939C33C877E}" type="presParOf" srcId="{4E743305-1674-4BDB-9931-68209537AA53}" destId="{839FB470-B514-47D8-A87D-90971D435E82}" srcOrd="1" destOrd="0" presId="urn:microsoft.com/office/officeart/2005/8/layout/cycle5"/>
     <dgm:cxn modelId="{8776D728-6048-4A1C-AC77-A7FF211C702E}" type="presParOf" srcId="{4E743305-1674-4BDB-9931-68209537AA53}" destId="{D9A75A5C-A763-48CB-9D34-226AE0D7AFDA}" srcOrd="2" destOrd="0" presId="urn:microsoft.com/office/officeart/2005/8/layout/cycle5"/>
@@ -19772,17 +19882,21 @@
   <dgm:bg>
     <a:noFill/>
   </dgm:bg>
-  <dgm:whole/>
+  <dgm:whole>
+    <a:ln>
+      <a:noFill/>
+    </a:ln>
+  </dgm:whole>
   <dgm:extLst>
     <a:ext uri="http://schemas.microsoft.com/office/drawing/2008/diagram">
-      <dsp:dataModelExt xmlns:dsp="http://schemas.microsoft.com/office/drawing/2008/diagram" xmlns="" relId="rId6" minVer="http://schemas.openxmlformats.org/drawingml/2006/diagram"/>
+      <dsp:dataModelExt xmlns:dsp="http://schemas.microsoft.com/office/drawing/2008/diagram" relId="rId6" minVer="http://schemas.openxmlformats.org/drawingml/2006/diagram"/>
     </a:ext>
   </dgm:extLst>
 </dgm:dataModel>
 </file>
 
 <file path=ppt/diagrams/drawing1.xml><?xml version="1.0" encoding="utf-8"?>
-<dsp:drawing xmlns:dgm="http://schemas.openxmlformats.org/drawingml/2006/diagram" xmlns:a="http://schemas.openxmlformats.org/drawingml/2006/main" xmlns:dsp="http://schemas.microsoft.com/office/drawing/2008/diagram">
+<dsp:drawing xmlns:dgm="http://schemas.openxmlformats.org/drawingml/2006/diagram" xmlns:dsp="http://schemas.microsoft.com/office/drawing/2008/diagram" xmlns:a="http://schemas.openxmlformats.org/drawingml/2006/main">
   <dsp:spTree>
     <dsp:nvGrpSpPr>
       <dsp:cNvPr id="0" name=""/>
@@ -19894,8 +20008,8 @@
         </a:p>
       </dsp:txBody>
       <dsp:txXfrm>
-        <a:off x="9022416" y="7552"/>
-        <a:ext cx="2757766" cy="1792548"/>
+        <a:off x="9109921" y="95057"/>
+        <a:ext cx="2582756" cy="1617538"/>
       </dsp:txXfrm>
     </dsp:sp>
     <dsp:sp modelId="{D9A75A5C-A763-48CB-9D34-226AE0D7AFDA}">
@@ -20056,8 +20170,8 @@
         </a:p>
       </dsp:txBody>
       <dsp:txXfrm>
-        <a:off x="13421238" y="1829604"/>
-        <a:ext cx="2757766" cy="1792548"/>
+        <a:off x="13508743" y="1917109"/>
+        <a:ext cx="2582756" cy="1617538"/>
       </dsp:txXfrm>
     </dsp:sp>
     <dsp:sp modelId="{CDF45B74-43D1-4864-8587-D1FAAB443F2E}">
@@ -20218,8 +20332,8 @@
         </a:p>
       </dsp:txBody>
       <dsp:txXfrm>
-        <a:off x="15243289" y="6228425"/>
-        <a:ext cx="2757766" cy="1792548"/>
+        <a:off x="15330794" y="6315930"/>
+        <a:ext cx="2582756" cy="1617538"/>
       </dsp:txXfrm>
     </dsp:sp>
     <dsp:sp modelId="{242F59CC-6117-43D5-8FE7-7065192DA727}">
@@ -20380,8 +20494,8 @@
         </a:p>
       </dsp:txBody>
       <dsp:txXfrm>
-        <a:off x="13421238" y="10627247"/>
-        <a:ext cx="2757766" cy="1792548"/>
+        <a:off x="13508743" y="10714752"/>
+        <a:ext cx="2582756" cy="1617538"/>
       </dsp:txXfrm>
     </dsp:sp>
     <dsp:sp modelId="{6222376B-A611-4BFF-A62F-963433A3CF5A}">
@@ -20542,8 +20656,8 @@
         </a:p>
       </dsp:txBody>
       <dsp:txXfrm>
-        <a:off x="9022416" y="12192003"/>
-        <a:ext cx="2757766" cy="1792548"/>
+        <a:off x="9109921" y="12279508"/>
+        <a:ext cx="2582756" cy="1617538"/>
       </dsp:txXfrm>
     </dsp:sp>
     <dsp:sp modelId="{5C7EE4B1-4898-4B7C-9DE1-A0EC78F54EDE}">
@@ -20704,8 +20818,8 @@
         </a:p>
       </dsp:txBody>
       <dsp:txXfrm>
-        <a:off x="4623595" y="10627247"/>
-        <a:ext cx="2757766" cy="1792548"/>
+        <a:off x="4711100" y="10714752"/>
+        <a:ext cx="2582756" cy="1617538"/>
       </dsp:txXfrm>
     </dsp:sp>
     <dsp:sp modelId="{5F10BEA9-A78E-43DB-B73B-503C391A832F}">
@@ -20866,8 +20980,8 @@
         </a:p>
       </dsp:txBody>
       <dsp:txXfrm>
-        <a:off x="2801543" y="6228425"/>
-        <a:ext cx="2757766" cy="1792548"/>
+        <a:off x="2889048" y="6315930"/>
+        <a:ext cx="2582756" cy="1617538"/>
       </dsp:txXfrm>
     </dsp:sp>
     <dsp:sp modelId="{1BF5A066-6D81-43E7-9526-E4A444BFC176}">
@@ -21028,8 +21142,8 @@
         </a:p>
       </dsp:txBody>
       <dsp:txXfrm>
-        <a:off x="4623595" y="1829604"/>
-        <a:ext cx="2757766" cy="1792548"/>
+        <a:off x="4711100" y="1917109"/>
+        <a:ext cx="2582756" cy="1617538"/>
       </dsp:txXfrm>
     </dsp:sp>
     <dsp:sp modelId="{DB534CCA-AE08-4581-ACCD-A09DBD19921E}">
@@ -25321,7 +25435,7 @@
           <p:nvPr>
             <p:extLst>
               <p:ext uri="{D42A27DB-BD31-4B8C-83A1-F6EECF244321}">
-                <p14:modId xmlns="" xmlns:p14="http://schemas.microsoft.com/office/powerpoint/2010/main" val="2922933472"/>
+                <p14:modId xmlns:p14="http://schemas.microsoft.com/office/powerpoint/2010/main" val="3998463943"/>
               </p:ext>
             </p:extLst>
           </p:nvPr>
@@ -25765,15 +25879,7 @@
             <a:pPr algn="just"/>
             <a:r>
               <a:rPr lang="en-US" sz="3200" dirty="0" smtClean="0"/>
-              <a:t>In our world, customers appear at the door given a random </a:t>
-            </a:r>
-            <a:r>
-              <a:rPr lang="en-US" sz="3200" dirty="0" smtClean="0"/>
-              <a:t>chance </a:t>
-            </a:r>
-            <a:r>
-              <a:rPr lang="en-US" sz="3200" dirty="0" smtClean="0"/>
-              <a:t>every world step.  They then randomly depth-first search for an open table. They request a burger after being asked a random number of times by the waiter. </a:t>
+              <a:t>In our world, customers appear at the door given a random chance every world step.  They then randomly depth-first search for an open table. They request a burger after being asked a random number of times by the waiter. </a:t>
             </a:r>
             <a:r>
               <a:rPr lang="en-US" sz="3200" dirty="0"/>
@@ -25781,31 +25887,7 @@
             </a:r>
             <a:r>
               <a:rPr lang="en-US" sz="3200" dirty="0" smtClean="0"/>
-              <a:t>fter receiving their burger from the </a:t>
-            </a:r>
-            <a:r>
-              <a:rPr lang="en-US" sz="3200" dirty="0" smtClean="0"/>
-              <a:t>robo</a:t>
-            </a:r>
-            <a:r>
-              <a:rPr lang="en-US" sz="3200" dirty="0" smtClean="0"/>
-              <a:t>t </a:t>
-            </a:r>
-            <a:r>
-              <a:rPr lang="en-US" sz="3200" dirty="0" smtClean="0"/>
-              <a:t>server</a:t>
-            </a:r>
-            <a:r>
-              <a:rPr lang="en-US" sz="3200" dirty="0" smtClean="0"/>
-              <a:t>, they leave searching </a:t>
-            </a:r>
-            <a:r>
-              <a:rPr lang="en-US" sz="3200" dirty="0" smtClean="0"/>
-              <a:t>breadth-first </a:t>
-            </a:r>
-            <a:r>
-              <a:rPr lang="en-US" sz="3200" dirty="0" smtClean="0"/>
-              <a:t>search for a door.</a:t>
+              <a:t>fter receiving their burger from the robot server, they leave searching breadth-first search for a door.</a:t>
             </a:r>
             <a:endParaRPr lang="en-US" sz="3200" dirty="0"/>
           </a:p>
@@ -25878,23 +25960,7 @@
             <a:pPr algn="just"/>
             <a:r>
               <a:rPr lang="en-US" sz="3200" dirty="0" smtClean="0"/>
-              <a:t>The Kitchen receives an order from the robot waiter and starts to cook the food if there is an open counter.  The food takes 10 steps to make. The food goes on the conveyor belt to the robot arm. If after 15 steps of cooking and the conveyor belt is full </a:t>
-            </a:r>
-            <a:r>
-              <a:rPr lang="en-US" sz="3200" dirty="0" smtClean="0"/>
-              <a:t>then the </a:t>
-            </a:r>
-            <a:r>
-              <a:rPr lang="en-US" sz="3200" dirty="0" smtClean="0"/>
-              <a:t>food is thrown away and </a:t>
-            </a:r>
-            <a:r>
-              <a:rPr lang="en-US" sz="3200" dirty="0" smtClean="0"/>
-              <a:t>the order is cooked </a:t>
-            </a:r>
-            <a:r>
-              <a:rPr lang="en-US" sz="3200" dirty="0" smtClean="0"/>
-              <a:t>again.</a:t>
+              <a:t>The Kitchen receives an order from the robot waiter and starts to cook the food if there is an open counter.  The food takes 10 steps to make. The food goes on the conveyor belt to the robot arm. If after 15 steps of cooking and the conveyor belt is full then the food is thrown away and the order is cooked again.</a:t>
             </a:r>
             <a:endParaRPr lang="en-US" sz="3200" dirty="0"/>
           </a:p>
@@ -25996,27 +26062,7 @@
             </a:pPr>
             <a:r>
               <a:rPr lang="en-US" sz="3200" dirty="0" smtClean="0"/>
-              <a:t>Each new customer </a:t>
-            </a:r>
-            <a:r>
-              <a:rPr lang="en-US" sz="3200" dirty="0" smtClean="0"/>
-              <a:t>is given</a:t>
-            </a:r>
-            <a:r>
-              <a:rPr lang="en-US" sz="3200" dirty="0" smtClean="0"/>
-              <a:t> </a:t>
-            </a:r>
-            <a:r>
-              <a:rPr lang="en-US" sz="3200" dirty="0" smtClean="0"/>
-              <a:t>to the next robot and </a:t>
-            </a:r>
-            <a:r>
-              <a:rPr lang="en-US" sz="3200" dirty="0" smtClean="0"/>
-              <a:t>eventually cycles </a:t>
-            </a:r>
-            <a:r>
-              <a:rPr lang="en-US" sz="3200" dirty="0" smtClean="0"/>
-              <a:t>back to the first robot.</a:t>
+              <a:t>Each new customer is given to the next robot and eventually cycles back to the first robot.</a:t>
             </a:r>
           </a:p>
           <a:p>
@@ -26036,15 +26082,7 @@
             </a:pPr>
             <a:r>
               <a:rPr lang="en-US" sz="3200" dirty="0" smtClean="0"/>
-              <a:t>T</a:t>
-            </a:r>
-            <a:r>
-              <a:rPr lang="en-US" sz="3200" dirty="0" smtClean="0"/>
-              <a:t>he room is split </a:t>
-            </a:r>
-            <a:r>
-              <a:rPr lang="en-US" sz="3200" dirty="0" smtClean="0"/>
-              <a:t>vertically in half</a:t>
+              <a:t>The room is split vertically in half</a:t>
             </a:r>
           </a:p>
           <a:p>
@@ -26280,7 +26318,7 @@
       </p:sp>
       <p:pic>
         <p:nvPicPr>
-          <p:cNvPr id="11272" name="Picture 8" descr="http://upload.wikimedia.org/wikipedia/commons/7/72/CMU_logo_stack_cmyk_red.jpg"/>
+          <p:cNvPr id="11274" name="Picture 10" descr="https://www.ri.cmu.edu/images/logos/RI_large.jpg"/>
           <p:cNvPicPr>
             <a:picLocks noChangeAspect="1" noChangeArrowheads="1"/>
           </p:cNvPicPr>
@@ -26288,43 +26326,6 @@
         </p:nvPicPr>
         <p:blipFill>
           <a:blip r:embed="rId8" cstate="print">
-            <a:clrChange>
-              <a:clrFrom>
-                <a:srgbClr val="FEFEFE"/>
-              </a:clrFrom>
-              <a:clrTo>
-                <a:srgbClr val="FEFEFE">
-                  <a:alpha val="0"/>
-                </a:srgbClr>
-              </a:clrTo>
-            </a:clrChange>
-          </a:blip>
-          <a:srcRect/>
-          <a:stretch>
-            <a:fillRect/>
-          </a:stretch>
-        </p:blipFill>
-        <p:spPr bwMode="auto">
-          <a:xfrm>
-            <a:off x="685800" y="209906"/>
-            <a:ext cx="4953000" cy="3219094"/>
-          </a:xfrm>
-          <a:prstGeom prst="rect">
-            <a:avLst/>
-          </a:prstGeom>
-          <a:noFill/>
-        </p:spPr>
-      </p:pic>
-      <p:pic>
-        <p:nvPicPr>
-          <p:cNvPr id="11274" name="Picture 10" descr="https://www.ri.cmu.edu/images/logos/RI_large.jpg"/>
-          <p:cNvPicPr>
-            <a:picLocks noChangeAspect="1" noChangeArrowheads="1"/>
-          </p:cNvPicPr>
-          <p:nvPr/>
-        </p:nvPicPr>
-        <p:blipFill>
-          <a:blip r:embed="rId9" cstate="print">
             <a:clrChange>
               <a:clrFrom>
                 <a:srgbClr val="FFFFFE"/>
@@ -26361,7 +26362,7 @@
           <p:nvPr>
             <p:extLst>
               <p:ext uri="{D42A27DB-BD31-4B8C-83A1-F6EECF244321}">
-                <p14:modId xmlns="" xmlns:p14="http://schemas.microsoft.com/office/powerpoint/2010/main" val="1333578443"/>
+                <p14:modId xmlns:p14="http://schemas.microsoft.com/office/powerpoint/2010/main" val="1333578443"/>
               </p:ext>
             </p:extLst>
           </p:nvPr>
@@ -26372,7 +26373,7 @@
         </p:xfrm>
         <a:graphic>
           <a:graphicData uri="http://schemas.openxmlformats.org/drawingml/2006/chart">
-            <c:chart xmlns:c="http://schemas.openxmlformats.org/drawingml/2006/chart" xmlns:r="http://schemas.openxmlformats.org/officeDocument/2006/relationships" r:id="rId10"/>
+            <c:chart xmlns:c="http://schemas.openxmlformats.org/drawingml/2006/chart" xmlns:r="http://schemas.openxmlformats.org/officeDocument/2006/relationships" r:id="rId9"/>
           </a:graphicData>
         </a:graphic>
       </p:graphicFrame>
@@ -26388,7 +26389,7 @@
         </p:xfrm>
         <a:graphic>
           <a:graphicData uri="http://schemas.openxmlformats.org/drawingml/2006/chart">
-            <c:chart xmlns:c="http://schemas.openxmlformats.org/drawingml/2006/chart" xmlns:r="http://schemas.openxmlformats.org/officeDocument/2006/relationships" r:id="rId11"/>
+            <c:chart xmlns:c="http://schemas.openxmlformats.org/drawingml/2006/chart" xmlns:r="http://schemas.openxmlformats.org/officeDocument/2006/relationships" r:id="rId10"/>
           </a:graphicData>
         </a:graphic>
       </p:graphicFrame>
@@ -26404,10 +26405,40 @@
         </p:xfrm>
         <a:graphic>
           <a:graphicData uri="http://schemas.openxmlformats.org/drawingml/2006/chart">
-            <c:chart xmlns:c="http://schemas.openxmlformats.org/drawingml/2006/chart" xmlns:r="http://schemas.openxmlformats.org/officeDocument/2006/relationships" r:id="rId12"/>
+            <c:chart xmlns:c="http://schemas.openxmlformats.org/drawingml/2006/chart" xmlns:r="http://schemas.openxmlformats.org/officeDocument/2006/relationships" r:id="rId11"/>
           </a:graphicData>
         </a:graphic>
       </p:graphicFrame>
+      <p:pic>
+        <p:nvPicPr>
+          <p:cNvPr id="3" name="Picture 2"/>
+          <p:cNvPicPr>
+            <a:picLocks noChangeAspect="1"/>
+          </p:cNvPicPr>
+          <p:nvPr/>
+        </p:nvPicPr>
+        <p:blipFill>
+          <a:blip r:embed="rId12">
+            <a:extLst>
+              <a:ext uri="{28A0092B-C50C-407E-A947-70E740481C1C}">
+                <a14:useLocalDpi xmlns:a14="http://schemas.microsoft.com/office/drawing/2010/main" val="0"/>
+              </a:ext>
+            </a:extLst>
+          </a:blip>
+          <a:stretch>
+            <a:fillRect/>
+          </a:stretch>
+        </p:blipFill>
+        <p:spPr>
+          <a:xfrm>
+            <a:off x="381000" y="242145"/>
+            <a:ext cx="4800600" cy="3115733"/>
+          </a:xfrm>
+          <a:prstGeom prst="rect">
+            <a:avLst/>
+          </a:prstGeom>
+        </p:spPr>
+      </p:pic>
     </p:spTree>
   </p:cSld>
   <p:clrMapOvr>

</xml_diff>